<commit_message>
Updated version of PPT
Still need small scale visualizations and one large scale.
</commit_message>
<xml_diff>
--- a/Video/Final Video.pptx
+++ b/Video/Final Video.pptx
@@ -37,7 +37,6 @@
     <p:sldId id="282" r:id="rId32"/>
     <p:sldId id="283" r:id="rId33"/>
     <p:sldId id="284" r:id="rId34"/>
-    <p:sldId id="285" r:id="rId35"/>
   </p:sldIdLst>
   <p:sldSz cy="5143500" cx="9144000"/>
   <p:notesSz cx="6858000" cy="9144000"/>
@@ -514,7 +513,7 @@
   <p:cSld>
     <p:spTree>
       <p:nvGrpSpPr>
-        <p:cNvPr id="106" name="Shape 106"/>
+        <p:cNvPr id="107" name="Shape 107"/>
         <p:cNvGrpSpPr/>
         <p:nvPr/>
       </p:nvGrpSpPr>
@@ -528,7 +527,7 @@
       </p:grpSpPr>
       <p:sp>
         <p:nvSpPr>
-          <p:cNvPr id="107" name="Shape 107"/>
+          <p:cNvPr id="108" name="Shape 108"/>
           <p:cNvSpPr/>
           <p:nvPr>
             <p:ph idx="2" type="sldImg"/>
@@ -572,7 +571,7 @@
       </p:sp>
       <p:sp>
         <p:nvSpPr>
-          <p:cNvPr id="108" name="Shape 108"/>
+          <p:cNvPr id="109" name="Shape 109"/>
           <p:cNvSpPr txBox="1"/>
           <p:nvPr>
             <p:ph idx="1" type="body"/>
@@ -619,7 +618,7 @@
   <p:cSld>
     <p:spTree>
       <p:nvGrpSpPr>
-        <p:cNvPr id="112" name="Shape 112"/>
+        <p:cNvPr id="113" name="Shape 113"/>
         <p:cNvGrpSpPr/>
         <p:nvPr/>
       </p:nvGrpSpPr>
@@ -633,7 +632,7 @@
       </p:grpSpPr>
       <p:sp>
         <p:nvSpPr>
-          <p:cNvPr id="113" name="Shape 113"/>
+          <p:cNvPr id="114" name="Shape 114"/>
           <p:cNvSpPr/>
           <p:nvPr>
             <p:ph idx="2" type="sldImg"/>
@@ -677,7 +676,7 @@
       </p:sp>
       <p:sp>
         <p:nvSpPr>
-          <p:cNvPr id="114" name="Shape 114"/>
+          <p:cNvPr id="115" name="Shape 115"/>
           <p:cNvSpPr txBox="1"/>
           <p:nvPr>
             <p:ph idx="1" type="body"/>
@@ -724,7 +723,7 @@
   <p:cSld>
     <p:spTree>
       <p:nvGrpSpPr>
-        <p:cNvPr id="118" name="Shape 118"/>
+        <p:cNvPr id="119" name="Shape 119"/>
         <p:cNvGrpSpPr/>
         <p:nvPr/>
       </p:nvGrpSpPr>
@@ -738,7 +737,7 @@
       </p:grpSpPr>
       <p:sp>
         <p:nvSpPr>
-          <p:cNvPr id="119" name="Shape 119"/>
+          <p:cNvPr id="120" name="Shape 120"/>
           <p:cNvSpPr/>
           <p:nvPr>
             <p:ph idx="2" type="sldImg"/>
@@ -782,7 +781,7 @@
       </p:sp>
       <p:sp>
         <p:nvSpPr>
-          <p:cNvPr id="120" name="Shape 120"/>
+          <p:cNvPr id="121" name="Shape 121"/>
           <p:cNvSpPr txBox="1"/>
           <p:nvPr>
             <p:ph idx="1" type="body"/>
@@ -829,7 +828,7 @@
   <p:cSld>
     <p:spTree>
       <p:nvGrpSpPr>
-        <p:cNvPr id="124" name="Shape 124"/>
+        <p:cNvPr id="125" name="Shape 125"/>
         <p:cNvGrpSpPr/>
         <p:nvPr/>
       </p:nvGrpSpPr>
@@ -843,7 +842,7 @@
       </p:grpSpPr>
       <p:sp>
         <p:nvSpPr>
-          <p:cNvPr id="125" name="Shape 125"/>
+          <p:cNvPr id="126" name="Shape 126"/>
           <p:cNvSpPr/>
           <p:nvPr>
             <p:ph idx="2" type="sldImg"/>
@@ -887,7 +886,7 @@
       </p:sp>
       <p:sp>
         <p:nvSpPr>
-          <p:cNvPr id="126" name="Shape 126"/>
+          <p:cNvPr id="127" name="Shape 127"/>
           <p:cNvSpPr txBox="1"/>
           <p:nvPr>
             <p:ph idx="1" type="body"/>
@@ -934,7 +933,7 @@
   <p:cSld>
     <p:spTree>
       <p:nvGrpSpPr>
-        <p:cNvPr id="130" name="Shape 130"/>
+        <p:cNvPr id="132" name="Shape 132"/>
         <p:cNvGrpSpPr/>
         <p:nvPr/>
       </p:nvGrpSpPr>
@@ -948,7 +947,7 @@
       </p:grpSpPr>
       <p:sp>
         <p:nvSpPr>
-          <p:cNvPr id="131" name="Shape 131"/>
+          <p:cNvPr id="133" name="Shape 133"/>
           <p:cNvSpPr/>
           <p:nvPr>
             <p:ph idx="2" type="sldImg"/>
@@ -992,7 +991,7 @@
       </p:sp>
       <p:sp>
         <p:nvSpPr>
-          <p:cNvPr id="132" name="Shape 132"/>
+          <p:cNvPr id="134" name="Shape 134"/>
           <p:cNvSpPr txBox="1"/>
           <p:nvPr>
             <p:ph idx="1" type="body"/>
@@ -1039,7 +1038,7 @@
   <p:cSld>
     <p:spTree>
       <p:nvGrpSpPr>
-        <p:cNvPr id="136" name="Shape 136"/>
+        <p:cNvPr id="138" name="Shape 138"/>
         <p:cNvGrpSpPr/>
         <p:nvPr/>
       </p:nvGrpSpPr>
@@ -1053,7 +1052,7 @@
       </p:grpSpPr>
       <p:sp>
         <p:nvSpPr>
-          <p:cNvPr id="137" name="Shape 137"/>
+          <p:cNvPr id="139" name="Shape 139"/>
           <p:cNvSpPr/>
           <p:nvPr>
             <p:ph idx="2" type="sldImg"/>
@@ -1097,7 +1096,7 @@
       </p:sp>
       <p:sp>
         <p:nvSpPr>
-          <p:cNvPr id="138" name="Shape 138"/>
+          <p:cNvPr id="140" name="Shape 140"/>
           <p:cNvSpPr txBox="1"/>
           <p:nvPr>
             <p:ph idx="1" type="body"/>
@@ -1144,7 +1143,7 @@
   <p:cSld>
     <p:spTree>
       <p:nvGrpSpPr>
-        <p:cNvPr id="142" name="Shape 142"/>
+        <p:cNvPr id="144" name="Shape 144"/>
         <p:cNvGrpSpPr/>
         <p:nvPr/>
       </p:nvGrpSpPr>
@@ -1158,7 +1157,7 @@
       </p:grpSpPr>
       <p:sp>
         <p:nvSpPr>
-          <p:cNvPr id="143" name="Shape 143"/>
+          <p:cNvPr id="145" name="Shape 145"/>
           <p:cNvSpPr/>
           <p:nvPr>
             <p:ph idx="2" type="sldImg"/>
@@ -1202,7 +1201,7 @@
       </p:sp>
       <p:sp>
         <p:nvSpPr>
-          <p:cNvPr id="144" name="Shape 144"/>
+          <p:cNvPr id="146" name="Shape 146"/>
           <p:cNvSpPr txBox="1"/>
           <p:nvPr>
             <p:ph idx="1" type="body"/>
@@ -1249,7 +1248,7 @@
   <p:cSld>
     <p:spTree>
       <p:nvGrpSpPr>
-        <p:cNvPr id="148" name="Shape 148"/>
+        <p:cNvPr id="150" name="Shape 150"/>
         <p:cNvGrpSpPr/>
         <p:nvPr/>
       </p:nvGrpSpPr>
@@ -1263,7 +1262,7 @@
       </p:grpSpPr>
       <p:sp>
         <p:nvSpPr>
-          <p:cNvPr id="149" name="Shape 149"/>
+          <p:cNvPr id="151" name="Shape 151"/>
           <p:cNvSpPr/>
           <p:nvPr>
             <p:ph idx="2" type="sldImg"/>
@@ -1307,7 +1306,7 @@
       </p:sp>
       <p:sp>
         <p:nvSpPr>
-          <p:cNvPr id="150" name="Shape 150"/>
+          <p:cNvPr id="152" name="Shape 152"/>
           <p:cNvSpPr txBox="1"/>
           <p:nvPr>
             <p:ph idx="1" type="body"/>
@@ -1354,7 +1353,7 @@
   <p:cSld>
     <p:spTree>
       <p:nvGrpSpPr>
-        <p:cNvPr id="154" name="Shape 154"/>
+        <p:cNvPr id="156" name="Shape 156"/>
         <p:cNvGrpSpPr/>
         <p:nvPr/>
       </p:nvGrpSpPr>
@@ -1368,7 +1367,7 @@
       </p:grpSpPr>
       <p:sp>
         <p:nvSpPr>
-          <p:cNvPr id="155" name="Shape 155"/>
+          <p:cNvPr id="157" name="Shape 157"/>
           <p:cNvSpPr/>
           <p:nvPr>
             <p:ph idx="2" type="sldImg"/>
@@ -1412,7 +1411,7 @@
       </p:sp>
       <p:sp>
         <p:nvSpPr>
-          <p:cNvPr id="156" name="Shape 156"/>
+          <p:cNvPr id="158" name="Shape 158"/>
           <p:cNvSpPr txBox="1"/>
           <p:nvPr>
             <p:ph idx="1" type="body"/>
@@ -1459,7 +1458,7 @@
   <p:cSld>
     <p:spTree>
       <p:nvGrpSpPr>
-        <p:cNvPr id="160" name="Shape 160"/>
+        <p:cNvPr id="162" name="Shape 162"/>
         <p:cNvGrpSpPr/>
         <p:nvPr/>
       </p:nvGrpSpPr>
@@ -1473,7 +1472,7 @@
       </p:grpSpPr>
       <p:sp>
         <p:nvSpPr>
-          <p:cNvPr id="161" name="Shape 161"/>
+          <p:cNvPr id="163" name="Shape 163"/>
           <p:cNvSpPr/>
           <p:nvPr>
             <p:ph idx="2" type="sldImg"/>
@@ -1517,7 +1516,7 @@
       </p:sp>
       <p:sp>
         <p:nvSpPr>
-          <p:cNvPr id="162" name="Shape 162"/>
+          <p:cNvPr id="164" name="Shape 164"/>
           <p:cNvSpPr txBox="1"/>
           <p:nvPr>
             <p:ph idx="1" type="body"/>
@@ -1669,7 +1668,7 @@
   <p:cSld>
     <p:spTree>
       <p:nvGrpSpPr>
-        <p:cNvPr id="166" name="Shape 166"/>
+        <p:cNvPr id="168" name="Shape 168"/>
         <p:cNvGrpSpPr/>
         <p:nvPr/>
       </p:nvGrpSpPr>
@@ -1683,7 +1682,7 @@
       </p:grpSpPr>
       <p:sp>
         <p:nvSpPr>
-          <p:cNvPr id="167" name="Shape 167"/>
+          <p:cNvPr id="169" name="Shape 169"/>
           <p:cNvSpPr/>
           <p:nvPr>
             <p:ph idx="2" type="sldImg"/>
@@ -1727,7 +1726,7 @@
       </p:sp>
       <p:sp>
         <p:nvSpPr>
-          <p:cNvPr id="168" name="Shape 168"/>
+          <p:cNvPr id="170" name="Shape 170"/>
           <p:cNvSpPr txBox="1"/>
           <p:nvPr>
             <p:ph idx="1" type="body"/>
@@ -1774,7 +1773,7 @@
   <p:cSld>
     <p:spTree>
       <p:nvGrpSpPr>
-        <p:cNvPr id="172" name="Shape 172"/>
+        <p:cNvPr id="174" name="Shape 174"/>
         <p:cNvGrpSpPr/>
         <p:nvPr/>
       </p:nvGrpSpPr>
@@ -1788,7 +1787,7 @@
       </p:grpSpPr>
       <p:sp>
         <p:nvSpPr>
-          <p:cNvPr id="173" name="Shape 173"/>
+          <p:cNvPr id="175" name="Shape 175"/>
           <p:cNvSpPr/>
           <p:nvPr>
             <p:ph idx="2" type="sldImg"/>
@@ -1832,7 +1831,7 @@
       </p:sp>
       <p:sp>
         <p:nvSpPr>
-          <p:cNvPr id="174" name="Shape 174"/>
+          <p:cNvPr id="176" name="Shape 176"/>
           <p:cNvSpPr txBox="1"/>
           <p:nvPr>
             <p:ph idx="1" type="body"/>
@@ -1879,7 +1878,7 @@
   <p:cSld>
     <p:spTree>
       <p:nvGrpSpPr>
-        <p:cNvPr id="178" name="Shape 178"/>
+        <p:cNvPr id="180" name="Shape 180"/>
         <p:cNvGrpSpPr/>
         <p:nvPr/>
       </p:nvGrpSpPr>
@@ -1893,7 +1892,7 @@
       </p:grpSpPr>
       <p:sp>
         <p:nvSpPr>
-          <p:cNvPr id="179" name="Shape 179"/>
+          <p:cNvPr id="181" name="Shape 181"/>
           <p:cNvSpPr/>
           <p:nvPr>
             <p:ph idx="2" type="sldImg"/>
@@ -1937,7 +1936,7 @@
       </p:sp>
       <p:sp>
         <p:nvSpPr>
-          <p:cNvPr id="180" name="Shape 180"/>
+          <p:cNvPr id="182" name="Shape 182"/>
           <p:cNvSpPr txBox="1"/>
           <p:nvPr>
             <p:ph idx="1" type="body"/>
@@ -1984,7 +1983,7 @@
   <p:cSld>
     <p:spTree>
       <p:nvGrpSpPr>
-        <p:cNvPr id="184" name="Shape 184"/>
+        <p:cNvPr id="186" name="Shape 186"/>
         <p:cNvGrpSpPr/>
         <p:nvPr/>
       </p:nvGrpSpPr>
@@ -1998,7 +1997,7 @@
       </p:grpSpPr>
       <p:sp>
         <p:nvSpPr>
-          <p:cNvPr id="185" name="Shape 185"/>
+          <p:cNvPr id="187" name="Shape 187"/>
           <p:cNvSpPr/>
           <p:nvPr>
             <p:ph idx="2" type="sldImg"/>
@@ -2042,7 +2041,7 @@
       </p:sp>
       <p:sp>
         <p:nvSpPr>
-          <p:cNvPr id="186" name="Shape 186"/>
+          <p:cNvPr id="188" name="Shape 188"/>
           <p:cNvSpPr txBox="1"/>
           <p:nvPr>
             <p:ph idx="1" type="body"/>
@@ -2089,7 +2088,7 @@
   <p:cSld>
     <p:spTree>
       <p:nvGrpSpPr>
-        <p:cNvPr id="190" name="Shape 190"/>
+        <p:cNvPr id="192" name="Shape 192"/>
         <p:cNvGrpSpPr/>
         <p:nvPr/>
       </p:nvGrpSpPr>
@@ -2103,7 +2102,7 @@
       </p:grpSpPr>
       <p:sp>
         <p:nvSpPr>
-          <p:cNvPr id="191" name="Shape 191"/>
+          <p:cNvPr id="193" name="Shape 193"/>
           <p:cNvSpPr/>
           <p:nvPr>
             <p:ph idx="2" type="sldImg"/>
@@ -2147,7 +2146,7 @@
       </p:sp>
       <p:sp>
         <p:nvSpPr>
-          <p:cNvPr id="192" name="Shape 192"/>
+          <p:cNvPr id="194" name="Shape 194"/>
           <p:cNvSpPr txBox="1"/>
           <p:nvPr>
             <p:ph idx="1" type="body"/>
@@ -2194,7 +2193,7 @@
   <p:cSld>
     <p:spTree>
       <p:nvGrpSpPr>
-        <p:cNvPr id="196" name="Shape 196"/>
+        <p:cNvPr id="198" name="Shape 198"/>
         <p:cNvGrpSpPr/>
         <p:nvPr/>
       </p:nvGrpSpPr>
@@ -2208,7 +2207,7 @@
       </p:grpSpPr>
       <p:sp>
         <p:nvSpPr>
-          <p:cNvPr id="197" name="Shape 197"/>
+          <p:cNvPr id="199" name="Shape 199"/>
           <p:cNvSpPr/>
           <p:nvPr>
             <p:ph idx="2" type="sldImg"/>
@@ -2252,7 +2251,7 @@
       </p:sp>
       <p:sp>
         <p:nvSpPr>
-          <p:cNvPr id="198" name="Shape 198"/>
+          <p:cNvPr id="200" name="Shape 200"/>
           <p:cNvSpPr txBox="1"/>
           <p:nvPr>
             <p:ph idx="1" type="body"/>
@@ -2299,7 +2298,7 @@
   <p:cSld>
     <p:spTree>
       <p:nvGrpSpPr>
-        <p:cNvPr id="202" name="Shape 202"/>
+        <p:cNvPr id="204" name="Shape 204"/>
         <p:cNvGrpSpPr/>
         <p:nvPr/>
       </p:nvGrpSpPr>
@@ -2313,7 +2312,7 @@
       </p:grpSpPr>
       <p:sp>
         <p:nvSpPr>
-          <p:cNvPr id="203" name="Shape 203"/>
+          <p:cNvPr id="205" name="Shape 205"/>
           <p:cNvSpPr/>
           <p:nvPr>
             <p:ph idx="2" type="sldImg"/>
@@ -2357,7 +2356,7 @@
       </p:sp>
       <p:sp>
         <p:nvSpPr>
-          <p:cNvPr id="204" name="Shape 204"/>
+          <p:cNvPr id="206" name="Shape 206"/>
           <p:cNvSpPr txBox="1"/>
           <p:nvPr>
             <p:ph idx="1" type="body"/>
@@ -2404,7 +2403,7 @@
   <p:cSld>
     <p:spTree>
       <p:nvGrpSpPr>
-        <p:cNvPr id="208" name="Shape 208"/>
+        <p:cNvPr id="210" name="Shape 210"/>
         <p:cNvGrpSpPr/>
         <p:nvPr/>
       </p:nvGrpSpPr>
@@ -2418,7 +2417,7 @@
       </p:grpSpPr>
       <p:sp>
         <p:nvSpPr>
-          <p:cNvPr id="209" name="Shape 209"/>
+          <p:cNvPr id="211" name="Shape 211"/>
           <p:cNvSpPr/>
           <p:nvPr>
             <p:ph idx="2" type="sldImg"/>
@@ -2462,7 +2461,7 @@
       </p:sp>
       <p:sp>
         <p:nvSpPr>
-          <p:cNvPr id="210" name="Shape 210"/>
+          <p:cNvPr id="212" name="Shape 212"/>
           <p:cNvSpPr txBox="1"/>
           <p:nvPr>
             <p:ph idx="1" type="body"/>
@@ -2509,7 +2508,7 @@
   <p:cSld>
     <p:spTree>
       <p:nvGrpSpPr>
-        <p:cNvPr id="214" name="Shape 214"/>
+        <p:cNvPr id="216" name="Shape 216"/>
         <p:cNvGrpSpPr/>
         <p:nvPr/>
       </p:nvGrpSpPr>
@@ -2523,7 +2522,7 @@
       </p:grpSpPr>
       <p:sp>
         <p:nvSpPr>
-          <p:cNvPr id="215" name="Shape 215"/>
+          <p:cNvPr id="217" name="Shape 217"/>
           <p:cNvSpPr/>
           <p:nvPr>
             <p:ph idx="2" type="sldImg"/>
@@ -2567,7 +2566,7 @@
       </p:sp>
       <p:sp>
         <p:nvSpPr>
-          <p:cNvPr id="216" name="Shape 216"/>
+          <p:cNvPr id="218" name="Shape 218"/>
           <p:cNvSpPr txBox="1"/>
           <p:nvPr>
             <p:ph idx="1" type="body"/>
@@ -2614,7 +2613,7 @@
   <p:cSld>
     <p:spTree>
       <p:nvGrpSpPr>
-        <p:cNvPr id="220" name="Shape 220"/>
+        <p:cNvPr id="222" name="Shape 222"/>
         <p:cNvGrpSpPr/>
         <p:nvPr/>
       </p:nvGrpSpPr>
@@ -2628,7 +2627,7 @@
       </p:grpSpPr>
       <p:sp>
         <p:nvSpPr>
-          <p:cNvPr id="221" name="Shape 221"/>
+          <p:cNvPr id="223" name="Shape 223"/>
           <p:cNvSpPr/>
           <p:nvPr>
             <p:ph idx="2" type="sldImg"/>
@@ -2672,7 +2671,7 @@
       </p:sp>
       <p:sp>
         <p:nvSpPr>
-          <p:cNvPr id="222" name="Shape 222"/>
+          <p:cNvPr id="224" name="Shape 224"/>
           <p:cNvSpPr txBox="1"/>
           <p:nvPr>
             <p:ph idx="1" type="body"/>
@@ -2819,12 +2818,12 @@
 </p:notes>
 </file>
 
-<file path=ppt/notesSlides/notesSlide30.xml><?xml version="1.0" encoding="utf-8"?>
+<file path=ppt/notesSlides/notesSlide4.xml><?xml version="1.0" encoding="utf-8"?>
 <p:notes xmlns:a="http://schemas.openxmlformats.org/drawingml/2006/main" xmlns:r="http://schemas.openxmlformats.org/officeDocument/2006/relationships" xmlns:mc="http://schemas.openxmlformats.org/markup-compatibility/2006" xmlns:mv="urn:schemas-microsoft-com:mac:vml" xmlns:p="http://schemas.openxmlformats.org/presentationml/2006/main" xmlns:c="http://schemas.openxmlformats.org/drawingml/2006/chart" xmlns:dgm="http://schemas.openxmlformats.org/drawingml/2006/diagram" xmlns:o="urn:schemas-microsoft-com:office:office" xmlns:v="urn:schemas-microsoft-com:vml" xmlns:pvml="urn:schemas-microsoft-com:office:powerpoint" xmlns:com="http://schemas.openxmlformats.org/drawingml/2006/compatibility" xmlns:p14="http://schemas.microsoft.com/office/powerpoint/2010/main" showMasterPhAnim="0" showMasterSp="0">
   <p:cSld>
     <p:spTree>
       <p:nvGrpSpPr>
-        <p:cNvPr id="226" name="Shape 226"/>
+        <p:cNvPr id="71" name="Shape 71"/>
         <p:cNvGrpSpPr/>
         <p:nvPr/>
       </p:nvGrpSpPr>
@@ -2838,7 +2837,7 @@
       </p:grpSpPr>
       <p:sp>
         <p:nvSpPr>
-          <p:cNvPr id="227" name="Shape 227"/>
+          <p:cNvPr id="72" name="Shape 72"/>
           <p:cNvSpPr/>
           <p:nvPr>
             <p:ph idx="2" type="sldImg"/>
@@ -2882,7 +2881,7 @@
       </p:sp>
       <p:sp>
         <p:nvSpPr>
-          <p:cNvPr id="228" name="Shape 228"/>
+          <p:cNvPr id="73" name="Shape 73"/>
           <p:cNvSpPr txBox="1"/>
           <p:nvPr>
             <p:ph idx="1" type="body"/>
@@ -2924,12 +2923,12 @@
 </p:notes>
 </file>
 
-<file path=ppt/notesSlides/notesSlide4.xml><?xml version="1.0" encoding="utf-8"?>
+<file path=ppt/notesSlides/notesSlide5.xml><?xml version="1.0" encoding="utf-8"?>
 <p:notes xmlns:a="http://schemas.openxmlformats.org/drawingml/2006/main" xmlns:r="http://schemas.openxmlformats.org/officeDocument/2006/relationships" xmlns:mc="http://schemas.openxmlformats.org/markup-compatibility/2006" xmlns:mv="urn:schemas-microsoft-com:mac:vml" xmlns:p="http://schemas.openxmlformats.org/presentationml/2006/main" xmlns:c="http://schemas.openxmlformats.org/drawingml/2006/chart" xmlns:dgm="http://schemas.openxmlformats.org/drawingml/2006/diagram" xmlns:o="urn:schemas-microsoft-com:office:office" xmlns:v="urn:schemas-microsoft-com:vml" xmlns:pvml="urn:schemas-microsoft-com:office:powerpoint" xmlns:com="http://schemas.openxmlformats.org/drawingml/2006/compatibility" xmlns:p14="http://schemas.microsoft.com/office/powerpoint/2010/main" showMasterPhAnim="0" showMasterSp="0">
   <p:cSld>
     <p:spTree>
       <p:nvGrpSpPr>
-        <p:cNvPr id="70" name="Shape 70"/>
+        <p:cNvPr id="78" name="Shape 78"/>
         <p:cNvGrpSpPr/>
         <p:nvPr/>
       </p:nvGrpSpPr>
@@ -2943,7 +2942,7 @@
       </p:grpSpPr>
       <p:sp>
         <p:nvSpPr>
-          <p:cNvPr id="71" name="Shape 71"/>
+          <p:cNvPr id="79" name="Shape 79"/>
           <p:cNvSpPr/>
           <p:nvPr>
             <p:ph idx="2" type="sldImg"/>
@@ -2987,7 +2986,7 @@
       </p:sp>
       <p:sp>
         <p:nvSpPr>
-          <p:cNvPr id="72" name="Shape 72"/>
+          <p:cNvPr id="80" name="Shape 80"/>
           <p:cNvSpPr txBox="1"/>
           <p:nvPr>
             <p:ph idx="1" type="body"/>
@@ -3029,12 +3028,12 @@
 </p:notes>
 </file>
 
-<file path=ppt/notesSlides/notesSlide5.xml><?xml version="1.0" encoding="utf-8"?>
+<file path=ppt/notesSlides/notesSlide6.xml><?xml version="1.0" encoding="utf-8"?>
 <p:notes xmlns:a="http://schemas.openxmlformats.org/drawingml/2006/main" xmlns:r="http://schemas.openxmlformats.org/officeDocument/2006/relationships" xmlns:mc="http://schemas.openxmlformats.org/markup-compatibility/2006" xmlns:mv="urn:schemas-microsoft-com:mac:vml" xmlns:p="http://schemas.openxmlformats.org/presentationml/2006/main" xmlns:c="http://schemas.openxmlformats.org/drawingml/2006/chart" xmlns:dgm="http://schemas.openxmlformats.org/drawingml/2006/diagram" xmlns:o="urn:schemas-microsoft-com:office:office" xmlns:v="urn:schemas-microsoft-com:vml" xmlns:pvml="urn:schemas-microsoft-com:office:powerpoint" xmlns:com="http://schemas.openxmlformats.org/drawingml/2006/compatibility" xmlns:p14="http://schemas.microsoft.com/office/powerpoint/2010/main" showMasterPhAnim="0" showMasterSp="0">
   <p:cSld>
     <p:spTree>
       <p:nvGrpSpPr>
-        <p:cNvPr id="76" name="Shape 76"/>
+        <p:cNvPr id="84" name="Shape 84"/>
         <p:cNvGrpSpPr/>
         <p:nvPr/>
       </p:nvGrpSpPr>
@@ -3048,7 +3047,7 @@
       </p:grpSpPr>
       <p:sp>
         <p:nvSpPr>
-          <p:cNvPr id="77" name="Shape 77"/>
+          <p:cNvPr id="85" name="Shape 85"/>
           <p:cNvSpPr/>
           <p:nvPr>
             <p:ph idx="2" type="sldImg"/>
@@ -3092,7 +3091,7 @@
       </p:sp>
       <p:sp>
         <p:nvSpPr>
-          <p:cNvPr id="78" name="Shape 78"/>
+          <p:cNvPr id="86" name="Shape 86"/>
           <p:cNvSpPr txBox="1"/>
           <p:nvPr>
             <p:ph idx="1" type="body"/>
@@ -3134,12 +3133,12 @@
 </p:notes>
 </file>
 
-<file path=ppt/notesSlides/notesSlide6.xml><?xml version="1.0" encoding="utf-8"?>
+<file path=ppt/notesSlides/notesSlide7.xml><?xml version="1.0" encoding="utf-8"?>
 <p:notes xmlns:a="http://schemas.openxmlformats.org/drawingml/2006/main" xmlns:r="http://schemas.openxmlformats.org/officeDocument/2006/relationships" xmlns:mc="http://schemas.openxmlformats.org/markup-compatibility/2006" xmlns:mv="urn:schemas-microsoft-com:mac:vml" xmlns:p="http://schemas.openxmlformats.org/presentationml/2006/main" xmlns:c="http://schemas.openxmlformats.org/drawingml/2006/chart" xmlns:dgm="http://schemas.openxmlformats.org/drawingml/2006/diagram" xmlns:o="urn:schemas-microsoft-com:office:office" xmlns:v="urn:schemas-microsoft-com:vml" xmlns:pvml="urn:schemas-microsoft-com:office:powerpoint" xmlns:com="http://schemas.openxmlformats.org/drawingml/2006/compatibility" xmlns:p14="http://schemas.microsoft.com/office/powerpoint/2010/main" showMasterPhAnim="0" showMasterSp="0">
   <p:cSld>
     <p:spTree>
       <p:nvGrpSpPr>
-        <p:cNvPr id="82" name="Shape 82"/>
+        <p:cNvPr id="89" name="Shape 89"/>
         <p:cNvGrpSpPr/>
         <p:nvPr/>
       </p:nvGrpSpPr>
@@ -3153,7 +3152,7 @@
       </p:grpSpPr>
       <p:sp>
         <p:nvSpPr>
-          <p:cNvPr id="83" name="Shape 83"/>
+          <p:cNvPr id="90" name="Shape 90"/>
           <p:cNvSpPr/>
           <p:nvPr>
             <p:ph idx="2" type="sldImg"/>
@@ -3197,7 +3196,7 @@
       </p:sp>
       <p:sp>
         <p:nvSpPr>
-          <p:cNvPr id="84" name="Shape 84"/>
+          <p:cNvPr id="91" name="Shape 91"/>
           <p:cNvSpPr txBox="1"/>
           <p:nvPr>
             <p:ph idx="1" type="body"/>
@@ -3239,12 +3238,12 @@
 </p:notes>
 </file>
 
-<file path=ppt/notesSlides/notesSlide7.xml><?xml version="1.0" encoding="utf-8"?>
+<file path=ppt/notesSlides/notesSlide8.xml><?xml version="1.0" encoding="utf-8"?>
 <p:notes xmlns:a="http://schemas.openxmlformats.org/drawingml/2006/main" xmlns:r="http://schemas.openxmlformats.org/officeDocument/2006/relationships" xmlns:mc="http://schemas.openxmlformats.org/markup-compatibility/2006" xmlns:mv="urn:schemas-microsoft-com:mac:vml" xmlns:p="http://schemas.openxmlformats.org/presentationml/2006/main" xmlns:c="http://schemas.openxmlformats.org/drawingml/2006/chart" xmlns:dgm="http://schemas.openxmlformats.org/drawingml/2006/diagram" xmlns:o="urn:schemas-microsoft-com:office:office" xmlns:v="urn:schemas-microsoft-com:vml" xmlns:pvml="urn:schemas-microsoft-com:office:powerpoint" xmlns:com="http://schemas.openxmlformats.org/drawingml/2006/compatibility" xmlns:p14="http://schemas.microsoft.com/office/powerpoint/2010/main" showMasterPhAnim="0" showMasterSp="0">
   <p:cSld>
     <p:spTree>
       <p:nvGrpSpPr>
-        <p:cNvPr id="88" name="Shape 88"/>
+        <p:cNvPr id="95" name="Shape 95"/>
         <p:cNvGrpSpPr/>
         <p:nvPr/>
       </p:nvGrpSpPr>
@@ -3258,7 +3257,7 @@
       </p:grpSpPr>
       <p:sp>
         <p:nvSpPr>
-          <p:cNvPr id="89" name="Shape 89"/>
+          <p:cNvPr id="96" name="Shape 96"/>
           <p:cNvSpPr/>
           <p:nvPr>
             <p:ph idx="2" type="sldImg"/>
@@ -3302,7 +3301,7 @@
       </p:sp>
       <p:sp>
         <p:nvSpPr>
-          <p:cNvPr id="90" name="Shape 90"/>
+          <p:cNvPr id="97" name="Shape 97"/>
           <p:cNvSpPr txBox="1"/>
           <p:nvPr>
             <p:ph idx="1" type="body"/>
@@ -3344,12 +3343,12 @@
 </p:notes>
 </file>
 
-<file path=ppt/notesSlides/notesSlide8.xml><?xml version="1.0" encoding="utf-8"?>
+<file path=ppt/notesSlides/notesSlide9.xml><?xml version="1.0" encoding="utf-8"?>
 <p:notes xmlns:a="http://schemas.openxmlformats.org/drawingml/2006/main" xmlns:r="http://schemas.openxmlformats.org/officeDocument/2006/relationships" xmlns:mc="http://schemas.openxmlformats.org/markup-compatibility/2006" xmlns:mv="urn:schemas-microsoft-com:mac:vml" xmlns:p="http://schemas.openxmlformats.org/presentationml/2006/main" xmlns:c="http://schemas.openxmlformats.org/drawingml/2006/chart" xmlns:dgm="http://schemas.openxmlformats.org/drawingml/2006/diagram" xmlns:o="urn:schemas-microsoft-com:office:office" xmlns:v="urn:schemas-microsoft-com:vml" xmlns:pvml="urn:schemas-microsoft-com:office:powerpoint" xmlns:com="http://schemas.openxmlformats.org/drawingml/2006/compatibility" xmlns:p14="http://schemas.microsoft.com/office/powerpoint/2010/main" showMasterPhAnim="0" showMasterSp="0">
   <p:cSld>
     <p:spTree>
       <p:nvGrpSpPr>
-        <p:cNvPr id="94" name="Shape 94"/>
+        <p:cNvPr id="101" name="Shape 101"/>
         <p:cNvGrpSpPr/>
         <p:nvPr/>
       </p:nvGrpSpPr>
@@ -3363,7 +3362,7 @@
       </p:grpSpPr>
       <p:sp>
         <p:nvSpPr>
-          <p:cNvPr id="95" name="Shape 95"/>
+          <p:cNvPr id="102" name="Shape 102"/>
           <p:cNvSpPr/>
           <p:nvPr>
             <p:ph idx="2" type="sldImg"/>
@@ -3407,112 +3406,7 @@
       </p:sp>
       <p:sp>
         <p:nvSpPr>
-          <p:cNvPr id="96" name="Shape 96"/>
-          <p:cNvSpPr txBox="1"/>
-          <p:nvPr>
-            <p:ph idx="1" type="body"/>
-          </p:nvPr>
-        </p:nvSpPr>
-        <p:spPr>
-          <a:xfrm>
-            <a:off x="685800" y="4343400"/>
-            <a:ext cx="5486399" cy="4114800"/>
-          </a:xfrm>
-          <a:prstGeom prst="rect">
-            <a:avLst/>
-          </a:prstGeom>
-        </p:spPr>
-        <p:txBody>
-          <a:bodyPr anchorCtr="0" anchor="t" bIns="91425" lIns="91425" rIns="91425" tIns="91425">
-            <a:noAutofit/>
-          </a:bodyPr>
-          <a:lstStyle/>
-          <a:p>
-            <a:pPr>
-              <a:spcBef>
-                <a:spcPts val="0"/>
-              </a:spcBef>
-              <a:buNone/>
-            </a:pPr>
-            <a:r>
-              <a:t/>
-            </a:r>
-            <a:endParaRPr/>
-          </a:p>
-        </p:txBody>
-      </p:sp>
-    </p:spTree>
-  </p:cSld>
-  <p:clrMapOvr>
-    <a:masterClrMapping/>
-  </p:clrMapOvr>
-</p:notes>
-</file>
-
-<file path=ppt/notesSlides/notesSlide9.xml><?xml version="1.0" encoding="utf-8"?>
-<p:notes xmlns:a="http://schemas.openxmlformats.org/drawingml/2006/main" xmlns:r="http://schemas.openxmlformats.org/officeDocument/2006/relationships" xmlns:mc="http://schemas.openxmlformats.org/markup-compatibility/2006" xmlns:mv="urn:schemas-microsoft-com:mac:vml" xmlns:p="http://schemas.openxmlformats.org/presentationml/2006/main" xmlns:c="http://schemas.openxmlformats.org/drawingml/2006/chart" xmlns:dgm="http://schemas.openxmlformats.org/drawingml/2006/diagram" xmlns:o="urn:schemas-microsoft-com:office:office" xmlns:v="urn:schemas-microsoft-com:vml" xmlns:pvml="urn:schemas-microsoft-com:office:powerpoint" xmlns:com="http://schemas.openxmlformats.org/drawingml/2006/compatibility" xmlns:p14="http://schemas.microsoft.com/office/powerpoint/2010/main" showMasterPhAnim="0" showMasterSp="0">
-  <p:cSld>
-    <p:spTree>
-      <p:nvGrpSpPr>
-        <p:cNvPr id="100" name="Shape 100"/>
-        <p:cNvGrpSpPr/>
-        <p:nvPr/>
-      </p:nvGrpSpPr>
-      <p:grpSpPr>
-        <a:xfrm>
-          <a:off x="0" y="0"/>
-          <a:ext cx="0" cy="0"/>
-          <a:chOff x="0" y="0"/>
-          <a:chExt cx="0" cy="0"/>
-        </a:xfrm>
-      </p:grpSpPr>
-      <p:sp>
-        <p:nvSpPr>
-          <p:cNvPr id="101" name="Shape 101"/>
-          <p:cNvSpPr/>
-          <p:nvPr>
-            <p:ph idx="2" type="sldImg"/>
-          </p:nvPr>
-        </p:nvSpPr>
-        <p:spPr>
-          <a:xfrm>
-            <a:off x="381300" y="685800"/>
-            <a:ext cx="6096000" cy="3429000"/>
-          </a:xfrm>
-          <a:custGeom>
-            <a:pathLst>
-              <a:path extrusionOk="0" h="120000" w="120000">
-                <a:moveTo>
-                  <a:pt x="0" y="0"/>
-                </a:moveTo>
-                <a:lnTo>
-                  <a:pt x="120000" y="0"/>
-                </a:lnTo>
-                <a:lnTo>
-                  <a:pt x="120000" y="120000"/>
-                </a:lnTo>
-                <a:lnTo>
-                  <a:pt x="0" y="120000"/>
-                </a:lnTo>
-                <a:close/>
-              </a:path>
-            </a:pathLst>
-          </a:custGeom>
-          <a:noFill/>
-          <a:ln cap="flat" cmpd="sng" w="9525">
-            <a:solidFill>
-              <a:srgbClr val="000000"/>
-            </a:solidFill>
-            <a:prstDash val="solid"/>
-            <a:round/>
-            <a:headEnd len="med" w="med" type="none"/>
-            <a:tailEnd len="med" w="med" type="none"/>
-          </a:ln>
-        </p:spPr>
-      </p:sp>
-      <p:sp>
-        <p:nvSpPr>
-          <p:cNvPr id="102" name="Shape 102"/>
+          <p:cNvPr id="103" name="Shape 103"/>
           <p:cNvSpPr txBox="1"/>
           <p:nvPr>
             <p:ph idx="1" type="body"/>
@@ -6931,7 +6825,7 @@
   <p:cSld>
     <p:spTree>
       <p:nvGrpSpPr>
-        <p:cNvPr id="103" name="Shape 103"/>
+        <p:cNvPr id="104" name="Shape 104"/>
         <p:cNvGrpSpPr/>
         <p:nvPr/>
       </p:nvGrpSpPr>
@@ -6945,7 +6839,7 @@
       </p:grpSpPr>
       <p:sp>
         <p:nvSpPr>
-          <p:cNvPr id="104" name="Shape 104"/>
+          <p:cNvPr id="105" name="Shape 105"/>
           <p:cNvSpPr txBox="1"/>
           <p:nvPr>
             <p:ph type="title"/>
@@ -6974,71 +6868,39 @@
             </a:pPr>
             <a:r>
               <a:rPr lang="en"/>
-              <a:t>Add Circular</a:t>
+              <a:t>Add Standard</a:t>
             </a:r>
           </a:p>
         </p:txBody>
       </p:sp>
-      <p:sp>
-        <p:nvSpPr>
-          <p:cNvPr id="105" name="Shape 105"/>
-          <p:cNvSpPr txBox="1"/>
-          <p:nvPr>
-            <p:ph idx="1" type="body"/>
-          </p:nvPr>
-        </p:nvSpPr>
-        <p:spPr>
-          <a:xfrm>
-            <a:off x="311700" y="1152475"/>
-            <a:ext cx="8520599" cy="3416400"/>
-          </a:xfrm>
-          <a:prstGeom prst="rect">
-            <a:avLst/>
-          </a:prstGeom>
-        </p:spPr>
-        <p:txBody>
-          <a:bodyPr anchorCtr="0" anchor="t" bIns="91425" lIns="91425" rIns="91425" tIns="91425">
-            <a:noAutofit/>
-          </a:bodyPr>
-          <a:lstStyle/>
-          <a:p>
-            <a:pPr rtl="0">
-              <a:spcBef>
-                <a:spcPts val="0"/>
-              </a:spcBef>
-              <a:buNone/>
-            </a:pPr>
-            <a:r>
-              <a:rPr lang="en"/>
-              <a:t>Show initial state of circular skip list</a:t>
-            </a:r>
-          </a:p>
-          <a:p>
-            <a:pPr rtl="0">
-              <a:spcBef>
-                <a:spcPts val="0"/>
-              </a:spcBef>
-              <a:buNone/>
-            </a:pPr>
-            <a:r>
-              <a:rPr lang="en"/>
-              <a:t>Show number being added</a:t>
-            </a:r>
-          </a:p>
-          <a:p>
-            <a:pPr>
-              <a:spcBef>
-                <a:spcPts val="0"/>
-              </a:spcBef>
-              <a:buNone/>
-            </a:pPr>
-            <a:r>
-              <a:rPr lang="en"/>
-              <a:t>Show/explain final state</a:t>
-            </a:r>
-          </a:p>
-        </p:txBody>
-      </p:sp>
+      <p:pic>
+        <p:nvPicPr>
+          <p:cNvPr id="106" name="Shape 106"/>
+          <p:cNvPicPr preferRelativeResize="0"/>
+          <p:nvPr/>
+        </p:nvPicPr>
+        <p:blipFill>
+          <a:blip r:embed="rId3">
+            <a:alphaModFix/>
+          </a:blip>
+          <a:stretch>
+            <a:fillRect/>
+          </a:stretch>
+        </p:blipFill>
+        <p:spPr>
+          <a:xfrm>
+            <a:off x="3132200" y="1354675"/>
+            <a:ext cx="5025674" cy="2556749"/>
+          </a:xfrm>
+          <a:prstGeom prst="rect">
+            <a:avLst/>
+          </a:prstGeom>
+          <a:noFill/>
+          <a:ln>
+            <a:noFill/>
+          </a:ln>
+        </p:spPr>
+      </p:pic>
     </p:spTree>
   </p:cSld>
   <p:clrMapOvr>
@@ -7055,7 +6917,7 @@
   <p:cSld>
     <p:spTree>
       <p:nvGrpSpPr>
-        <p:cNvPr id="109" name="Shape 109"/>
+        <p:cNvPr id="110" name="Shape 110"/>
         <p:cNvGrpSpPr/>
         <p:nvPr/>
       </p:nvGrpSpPr>
@@ -7069,7 +6931,7 @@
       </p:grpSpPr>
       <p:sp>
         <p:nvSpPr>
-          <p:cNvPr id="110" name="Shape 110"/>
+          <p:cNvPr id="111" name="Shape 111"/>
           <p:cNvSpPr txBox="1"/>
           <p:nvPr>
             <p:ph type="title"/>
@@ -7090,6 +6952,18 @@
           </a:bodyPr>
           <a:lstStyle/>
           <a:p>
+            <a:pPr rtl="0">
+              <a:spcBef>
+                <a:spcPts val="0"/>
+              </a:spcBef>
+              <a:buNone/>
+            </a:pPr>
+            <a:r>
+              <a:rPr lang="en"/>
+              <a:t>Delete Circular</a:t>
+            </a:r>
+          </a:p>
+          <a:p>
             <a:pPr>
               <a:spcBef>
                 <a:spcPts val="0"/>
@@ -7098,71 +6972,39 @@
             </a:pPr>
             <a:r>
               <a:rPr lang="en"/>
-              <a:t>Add Standard</a:t>
+              <a:t> </a:t>
             </a:r>
           </a:p>
         </p:txBody>
       </p:sp>
-      <p:sp>
-        <p:nvSpPr>
-          <p:cNvPr id="111" name="Shape 111"/>
-          <p:cNvSpPr txBox="1"/>
-          <p:nvPr>
-            <p:ph idx="1" type="body"/>
-          </p:nvPr>
-        </p:nvSpPr>
-        <p:spPr>
-          <a:xfrm>
-            <a:off x="311700" y="1152475"/>
-            <a:ext cx="8520599" cy="3416400"/>
-          </a:xfrm>
-          <a:prstGeom prst="rect">
-            <a:avLst/>
-          </a:prstGeom>
-        </p:spPr>
-        <p:txBody>
-          <a:bodyPr anchorCtr="0" anchor="t" bIns="91425" lIns="91425" rIns="91425" tIns="91425">
-            <a:noAutofit/>
-          </a:bodyPr>
-          <a:lstStyle/>
-          <a:p>
-            <a:pPr rtl="0">
-              <a:spcBef>
-                <a:spcPts val="0"/>
-              </a:spcBef>
-              <a:buNone/>
-            </a:pPr>
-            <a:r>
-              <a:rPr lang="en"/>
-              <a:t>Show initial state of standard skip list</a:t>
-            </a:r>
-          </a:p>
-          <a:p>
-            <a:pPr rtl="0">
-              <a:spcBef>
-                <a:spcPts val="0"/>
-              </a:spcBef>
-              <a:buNone/>
-            </a:pPr>
-            <a:r>
-              <a:rPr lang="en"/>
-              <a:t>Show number being added</a:t>
-            </a:r>
-          </a:p>
-          <a:p>
-            <a:pPr>
-              <a:spcBef>
-                <a:spcPts val="0"/>
-              </a:spcBef>
-              <a:buNone/>
-            </a:pPr>
-            <a:r>
-              <a:rPr lang="en"/>
-              <a:t>Show/explain final state</a:t>
-            </a:r>
-          </a:p>
-        </p:txBody>
-      </p:sp>
+      <p:pic>
+        <p:nvPicPr>
+          <p:cNvPr id="112" name="Shape 112"/>
+          <p:cNvPicPr preferRelativeResize="0"/>
+          <p:nvPr/>
+        </p:nvPicPr>
+        <p:blipFill>
+          <a:blip r:embed="rId3">
+            <a:alphaModFix/>
+          </a:blip>
+          <a:stretch>
+            <a:fillRect/>
+          </a:stretch>
+        </p:blipFill>
+        <p:spPr>
+          <a:xfrm>
+            <a:off x="3347575" y="881325"/>
+            <a:ext cx="4612725" cy="3532949"/>
+          </a:xfrm>
+          <a:prstGeom prst="rect">
+            <a:avLst/>
+          </a:prstGeom>
+          <a:noFill/>
+          <a:ln>
+            <a:noFill/>
+          </a:ln>
+        </p:spPr>
+      </p:pic>
     </p:spTree>
   </p:cSld>
   <p:clrMapOvr>
@@ -7179,7 +7021,7 @@
   <p:cSld>
     <p:spTree>
       <p:nvGrpSpPr>
-        <p:cNvPr id="115" name="Shape 115"/>
+        <p:cNvPr id="116" name="Shape 116"/>
         <p:cNvGrpSpPr/>
         <p:nvPr/>
       </p:nvGrpSpPr>
@@ -7193,7 +7035,7 @@
       </p:grpSpPr>
       <p:sp>
         <p:nvSpPr>
-          <p:cNvPr id="116" name="Shape 116"/>
+          <p:cNvPr id="117" name="Shape 117"/>
           <p:cNvSpPr txBox="1"/>
           <p:nvPr>
             <p:ph type="title"/>
@@ -7214,7 +7056,7 @@
           </a:bodyPr>
           <a:lstStyle/>
           <a:p>
-            <a:pPr rtl="0">
+            <a:pPr>
               <a:spcBef>
                 <a:spcPts val="0"/>
               </a:spcBef>
@@ -7222,83 +7064,39 @@
             </a:pPr>
             <a:r>
               <a:rPr lang="en"/>
-              <a:t>Delete Circular</a:t>
-            </a:r>
-          </a:p>
-          <a:p>
-            <a:pPr>
-              <a:spcBef>
-                <a:spcPts val="0"/>
-              </a:spcBef>
-              <a:buNone/>
-            </a:pPr>
-            <a:r>
-              <a:rPr lang="en"/>
-              <a:t> </a:t>
+              <a:t>Delete Standard</a:t>
             </a:r>
           </a:p>
         </p:txBody>
       </p:sp>
-      <p:sp>
-        <p:nvSpPr>
-          <p:cNvPr id="117" name="Shape 117"/>
-          <p:cNvSpPr txBox="1"/>
-          <p:nvPr>
-            <p:ph idx="1" type="body"/>
-          </p:nvPr>
-        </p:nvSpPr>
-        <p:spPr>
-          <a:xfrm>
-            <a:off x="311700" y="1152475"/>
-            <a:ext cx="8520599" cy="3416400"/>
-          </a:xfrm>
-          <a:prstGeom prst="rect">
-            <a:avLst/>
-          </a:prstGeom>
-        </p:spPr>
-        <p:txBody>
-          <a:bodyPr anchorCtr="0" anchor="t" bIns="91425" lIns="91425" rIns="91425" tIns="91425">
-            <a:noAutofit/>
-          </a:bodyPr>
-          <a:lstStyle/>
-          <a:p>
-            <a:pPr rtl="0">
-              <a:spcBef>
-                <a:spcPts val="0"/>
-              </a:spcBef>
-              <a:buNone/>
-            </a:pPr>
-            <a:r>
-              <a:rPr lang="en"/>
-              <a:t>Show initial state of circular skip list</a:t>
-            </a:r>
-          </a:p>
-          <a:p>
-            <a:pPr rtl="0">
-              <a:spcBef>
-                <a:spcPts val="0"/>
-              </a:spcBef>
-              <a:buNone/>
-            </a:pPr>
-            <a:r>
-              <a:rPr lang="en"/>
-              <a:t>Show number being deleted</a:t>
-            </a:r>
-          </a:p>
-          <a:p>
-            <a:pPr>
-              <a:spcBef>
-                <a:spcPts val="0"/>
-              </a:spcBef>
-              <a:buNone/>
-            </a:pPr>
-            <a:r>
-              <a:rPr lang="en"/>
-              <a:t>Show/explain final state</a:t>
-            </a:r>
-          </a:p>
-        </p:txBody>
-      </p:sp>
+      <p:pic>
+        <p:nvPicPr>
+          <p:cNvPr id="118" name="Shape 118"/>
+          <p:cNvPicPr preferRelativeResize="0"/>
+          <p:nvPr/>
+        </p:nvPicPr>
+        <p:blipFill>
+          <a:blip r:embed="rId3">
+            <a:alphaModFix/>
+          </a:blip>
+          <a:stretch>
+            <a:fillRect/>
+          </a:stretch>
+        </p:blipFill>
+        <p:spPr>
+          <a:xfrm>
+            <a:off x="2965925" y="1562100"/>
+            <a:ext cx="4857750" cy="2019300"/>
+          </a:xfrm>
+          <a:prstGeom prst="rect">
+            <a:avLst/>
+          </a:prstGeom>
+          <a:noFill/>
+          <a:ln>
+            <a:noFill/>
+          </a:ln>
+        </p:spPr>
+      </p:pic>
     </p:spTree>
   </p:cSld>
   <p:clrMapOvr>
@@ -7315,7 +7113,7 @@
   <p:cSld>
     <p:spTree>
       <p:nvGrpSpPr>
-        <p:cNvPr id="121" name="Shape 121"/>
+        <p:cNvPr id="122" name="Shape 122"/>
         <p:cNvGrpSpPr/>
         <p:nvPr/>
       </p:nvGrpSpPr>
@@ -7329,7 +7127,7 @@
       </p:grpSpPr>
       <p:sp>
         <p:nvSpPr>
-          <p:cNvPr id="122" name="Shape 122"/>
+          <p:cNvPr id="123" name="Shape 123"/>
           <p:cNvSpPr txBox="1"/>
           <p:nvPr>
             <p:ph type="title"/>
@@ -7337,8 +7135,8 @@
         </p:nvSpPr>
         <p:spPr>
           <a:xfrm>
-            <a:off x="311700" y="445025"/>
-            <a:ext cx="8520599" cy="572699"/>
+            <a:off x="210325" y="363925"/>
+            <a:ext cx="3150299" cy="2553900"/>
           </a:xfrm>
           <a:prstGeom prst="rect">
             <a:avLst/>
@@ -7358,71 +7156,39 @@
             </a:pPr>
             <a:r>
               <a:rPr lang="en"/>
-              <a:t>Delete Standard</a:t>
+              <a:t>Change Origen</a:t>
             </a:r>
           </a:p>
         </p:txBody>
       </p:sp>
-      <p:sp>
-        <p:nvSpPr>
-          <p:cNvPr id="123" name="Shape 123"/>
-          <p:cNvSpPr txBox="1"/>
-          <p:nvPr>
-            <p:ph idx="1" type="body"/>
-          </p:nvPr>
-        </p:nvSpPr>
-        <p:spPr>
-          <a:xfrm>
-            <a:off x="311700" y="1152475"/>
-            <a:ext cx="8520599" cy="3416400"/>
-          </a:xfrm>
-          <a:prstGeom prst="rect">
-            <a:avLst/>
-          </a:prstGeom>
-        </p:spPr>
-        <p:txBody>
-          <a:bodyPr anchorCtr="0" anchor="t" bIns="91425" lIns="91425" rIns="91425" tIns="91425">
-            <a:noAutofit/>
-          </a:bodyPr>
-          <a:lstStyle/>
-          <a:p>
-            <a:pPr rtl="0">
-              <a:spcBef>
-                <a:spcPts val="0"/>
-              </a:spcBef>
-              <a:buNone/>
-            </a:pPr>
-            <a:r>
-              <a:rPr lang="en"/>
-              <a:t>Show initial state of circular skip list</a:t>
-            </a:r>
-          </a:p>
-          <a:p>
-            <a:pPr rtl="0">
-              <a:spcBef>
-                <a:spcPts val="0"/>
-              </a:spcBef>
-              <a:buNone/>
-            </a:pPr>
-            <a:r>
-              <a:rPr lang="en"/>
-              <a:t>Show number being deleted</a:t>
-            </a:r>
-          </a:p>
-          <a:p>
-            <a:pPr>
-              <a:spcBef>
-                <a:spcPts val="0"/>
-              </a:spcBef>
-              <a:buNone/>
-            </a:pPr>
-            <a:r>
-              <a:rPr lang="en"/>
-              <a:t>Show/explain final state</a:t>
-            </a:r>
-          </a:p>
-        </p:txBody>
-      </p:sp>
+      <p:pic>
+        <p:nvPicPr>
+          <p:cNvPr id="124" name="Shape 124"/>
+          <p:cNvPicPr preferRelativeResize="0"/>
+          <p:nvPr/>
+        </p:nvPicPr>
+        <p:blipFill>
+          <a:blip r:embed="rId3">
+            <a:alphaModFix/>
+          </a:blip>
+          <a:stretch>
+            <a:fillRect/>
+          </a:stretch>
+        </p:blipFill>
+        <p:spPr>
+          <a:xfrm>
+            <a:off x="2965900" y="68075"/>
+            <a:ext cx="5986425" cy="5007336"/>
+          </a:xfrm>
+          <a:prstGeom prst="rect">
+            <a:avLst/>
+          </a:prstGeom>
+          <a:noFill/>
+          <a:ln>
+            <a:noFill/>
+          </a:ln>
+        </p:spPr>
+      </p:pic>
     </p:spTree>
   </p:cSld>
   <p:clrMapOvr>
@@ -7439,7 +7205,7 @@
   <p:cSld>
     <p:spTree>
       <p:nvGrpSpPr>
-        <p:cNvPr id="127" name="Shape 127"/>
+        <p:cNvPr id="128" name="Shape 128"/>
         <p:cNvGrpSpPr/>
         <p:nvPr/>
       </p:nvGrpSpPr>
@@ -7453,7 +7219,7 @@
       </p:grpSpPr>
       <p:sp>
         <p:nvSpPr>
-          <p:cNvPr id="128" name="Shape 128"/>
+          <p:cNvPr id="129" name="Shape 129"/>
           <p:cNvSpPr txBox="1"/>
           <p:nvPr>
             <p:ph type="title"/>
@@ -7461,7 +7227,7 @@
         </p:nvSpPr>
         <p:spPr>
           <a:xfrm>
-            <a:off x="210325" y="363925"/>
+            <a:off x="311700" y="445025"/>
             <a:ext cx="8520599" cy="572699"/>
           </a:xfrm>
           <a:prstGeom prst="rect">
@@ -7482,71 +7248,67 @@
             </a:pPr>
             <a:r>
               <a:rPr lang="en"/>
-              <a:t>Change Origen, Circular Only</a:t>
+              <a:t>Change Height	</a:t>
             </a:r>
           </a:p>
         </p:txBody>
       </p:sp>
-      <p:sp>
-        <p:nvSpPr>
-          <p:cNvPr id="129" name="Shape 129"/>
-          <p:cNvSpPr txBox="1"/>
-          <p:nvPr>
-            <p:ph idx="1" type="body"/>
-          </p:nvPr>
-        </p:nvSpPr>
-        <p:spPr>
-          <a:xfrm>
-            <a:off x="311700" y="1152475"/>
-            <a:ext cx="8520599" cy="3416400"/>
-          </a:xfrm>
-          <a:prstGeom prst="rect">
-            <a:avLst/>
-          </a:prstGeom>
-        </p:spPr>
-        <p:txBody>
-          <a:bodyPr anchorCtr="0" anchor="t" bIns="91425" lIns="91425" rIns="91425" tIns="91425">
-            <a:noAutofit/>
-          </a:bodyPr>
-          <a:lstStyle/>
-          <a:p>
-            <a:pPr rtl="0">
-              <a:spcBef>
-                <a:spcPts val="0"/>
-              </a:spcBef>
-              <a:buNone/>
-            </a:pPr>
-            <a:r>
-              <a:rPr lang="en"/>
-              <a:t>Show initial state of standard skip list</a:t>
-            </a:r>
-          </a:p>
-          <a:p>
-            <a:pPr rtl="0">
-              <a:spcBef>
-                <a:spcPts val="0"/>
-              </a:spcBef>
-              <a:buNone/>
-            </a:pPr>
-            <a:r>
-              <a:rPr lang="en"/>
-              <a:t>Explain how new origin is chosen</a:t>
-            </a:r>
-          </a:p>
-          <a:p>
-            <a:pPr>
-              <a:spcBef>
-                <a:spcPts val="0"/>
-              </a:spcBef>
-              <a:buNone/>
-            </a:pPr>
-            <a:r>
-              <a:rPr lang="en"/>
-              <a:t>Show/explain final state</a:t>
-            </a:r>
-          </a:p>
-        </p:txBody>
-      </p:sp>
+      <p:pic>
+        <p:nvPicPr>
+          <p:cNvPr id="130" name="Shape 130"/>
+          <p:cNvPicPr preferRelativeResize="0"/>
+          <p:nvPr/>
+        </p:nvPicPr>
+        <p:blipFill>
+          <a:blip r:embed="rId3">
+            <a:alphaModFix/>
+          </a:blip>
+          <a:stretch>
+            <a:fillRect/>
+          </a:stretch>
+        </p:blipFill>
+        <p:spPr>
+          <a:xfrm>
+            <a:off x="0" y="1344925"/>
+            <a:ext cx="4208224" cy="2294950"/>
+          </a:xfrm>
+          <a:prstGeom prst="rect">
+            <a:avLst/>
+          </a:prstGeom>
+          <a:noFill/>
+          <a:ln>
+            <a:noFill/>
+          </a:ln>
+        </p:spPr>
+      </p:pic>
+      <p:pic>
+        <p:nvPicPr>
+          <p:cNvPr id="131" name="Shape 131"/>
+          <p:cNvPicPr preferRelativeResize="0"/>
+          <p:nvPr/>
+        </p:nvPicPr>
+        <p:blipFill>
+          <a:blip r:embed="rId4">
+            <a:alphaModFix/>
+          </a:blip>
+          <a:stretch>
+            <a:fillRect/>
+          </a:stretch>
+        </p:blipFill>
+        <p:spPr>
+          <a:xfrm>
+            <a:off x="4226500" y="102262"/>
+            <a:ext cx="4828199" cy="4938975"/>
+          </a:xfrm>
+          <a:prstGeom prst="rect">
+            <a:avLst/>
+          </a:prstGeom>
+          <a:noFill/>
+          <a:ln>
+            <a:noFill/>
+          </a:ln>
+        </p:spPr>
+      </p:pic>
     </p:spTree>
   </p:cSld>
   <p:clrMapOvr>
@@ -7563,7 +7325,7 @@
   <p:cSld>
     <p:spTree>
       <p:nvGrpSpPr>
-        <p:cNvPr id="133" name="Shape 133"/>
+        <p:cNvPr id="135" name="Shape 135"/>
         <p:cNvGrpSpPr/>
         <p:nvPr/>
       </p:nvGrpSpPr>
@@ -7577,7 +7339,7 @@
       </p:grpSpPr>
       <p:sp>
         <p:nvSpPr>
-          <p:cNvPr id="134" name="Shape 134"/>
+          <p:cNvPr id="136" name="Shape 136"/>
           <p:cNvSpPr txBox="1"/>
           <p:nvPr>
             <p:ph type="title"/>
@@ -7606,14 +7368,14 @@
             </a:pPr>
             <a:r>
               <a:rPr lang="en"/>
-              <a:t>Change Height	</a:t>
+              <a:t>Large Scale Visualization</a:t>
             </a:r>
           </a:p>
         </p:txBody>
       </p:sp>
       <p:sp>
         <p:nvSpPr>
-          <p:cNvPr id="135" name="Shape 135"/>
+          <p:cNvPr id="137" name="Shape 137"/>
           <p:cNvSpPr txBox="1"/>
           <p:nvPr>
             <p:ph idx="1" type="body"/>
@@ -7642,11 +7404,11 @@
             </a:pPr>
             <a:r>
               <a:rPr lang="en"/>
-              <a:t>Show initial state of circular skip list (with improper #nodes for that height)</a:t>
-            </a:r>
-          </a:p>
-          <a:p>
-            <a:pPr rtl="0">
+              <a:t>“And after 60,000 additions it looks like this “</a:t>
+            </a:r>
+          </a:p>
+          <a:p>
+            <a:pPr>
               <a:spcBef>
                 <a:spcPts val="0"/>
               </a:spcBef>
@@ -7654,19 +7416,7 @@
             </a:pPr>
             <a:r>
               <a:rPr lang="en"/>
-              <a:t>Explain how height is chosen/changed</a:t>
-            </a:r>
-          </a:p>
-          <a:p>
-            <a:pPr>
-              <a:spcBef>
-                <a:spcPts val="0"/>
-              </a:spcBef>
-              <a:buNone/>
-            </a:pPr>
-            <a:r>
-              <a:rPr lang="en"/>
-              <a:t>Show/explain final state</a:t>
+              <a:t>Insert sweet picture.</a:t>
             </a:r>
           </a:p>
         </p:txBody>
@@ -7687,7 +7437,7 @@
   <p:cSld>
     <p:spTree>
       <p:nvGrpSpPr>
-        <p:cNvPr id="139" name="Shape 139"/>
+        <p:cNvPr id="141" name="Shape 141"/>
         <p:cNvGrpSpPr/>
         <p:nvPr/>
       </p:nvGrpSpPr>
@@ -7701,7 +7451,7 @@
       </p:grpSpPr>
       <p:sp>
         <p:nvSpPr>
-          <p:cNvPr id="140" name="Shape 140"/>
+          <p:cNvPr id="142" name="Shape 142"/>
           <p:cNvSpPr txBox="1"/>
           <p:nvPr>
             <p:ph type="title"/>
@@ -7730,59 +7480,39 @@
             </a:pPr>
             <a:r>
               <a:rPr lang="en"/>
-              <a:t>Large Scale Visualization</a:t>
+              <a:t>We Programmed It!</a:t>
             </a:r>
           </a:p>
         </p:txBody>
       </p:sp>
-      <p:sp>
-        <p:nvSpPr>
-          <p:cNvPr id="141" name="Shape 141"/>
-          <p:cNvSpPr txBox="1"/>
-          <p:nvPr>
-            <p:ph idx="1" type="body"/>
-          </p:nvPr>
-        </p:nvSpPr>
-        <p:spPr>
-          <a:xfrm>
-            <a:off x="311700" y="1152475"/>
-            <a:ext cx="8520599" cy="3416400"/>
-          </a:xfrm>
-          <a:prstGeom prst="rect">
-            <a:avLst/>
-          </a:prstGeom>
-        </p:spPr>
-        <p:txBody>
-          <a:bodyPr anchorCtr="0" anchor="t" bIns="91425" lIns="91425" rIns="91425" tIns="91425">
-            <a:noAutofit/>
-          </a:bodyPr>
-          <a:lstStyle/>
-          <a:p>
-            <a:pPr rtl="0">
-              <a:spcBef>
-                <a:spcPts val="0"/>
-              </a:spcBef>
-              <a:buNone/>
-            </a:pPr>
-            <a:r>
-              <a:rPr lang="en"/>
-              <a:t>“And after 60,000 additions it looks like this “</a:t>
-            </a:r>
-          </a:p>
-          <a:p>
-            <a:pPr>
-              <a:spcBef>
-                <a:spcPts val="0"/>
-              </a:spcBef>
-              <a:buNone/>
-            </a:pPr>
-            <a:r>
-              <a:rPr lang="en"/>
-              <a:t>Insert sweet picture.</a:t>
-            </a:r>
-          </a:p>
-        </p:txBody>
-      </p:sp>
+      <p:pic>
+        <p:nvPicPr>
+          <p:cNvPr id="143" name="Shape 143"/>
+          <p:cNvPicPr preferRelativeResize="0"/>
+          <p:nvPr/>
+        </p:nvPicPr>
+        <p:blipFill>
+          <a:blip r:embed="rId3">
+            <a:alphaModFix/>
+          </a:blip>
+          <a:stretch>
+            <a:fillRect/>
+          </a:stretch>
+        </p:blipFill>
+        <p:spPr>
+          <a:xfrm>
+            <a:off x="3656300" y="94425"/>
+            <a:ext cx="5358350" cy="4954639"/>
+          </a:xfrm>
+          <a:prstGeom prst="rect">
+            <a:avLst/>
+          </a:prstGeom>
+          <a:noFill/>
+          <a:ln>
+            <a:noFill/>
+          </a:ln>
+        </p:spPr>
+      </p:pic>
     </p:spTree>
   </p:cSld>
   <p:clrMapOvr>
@@ -7799,7 +7529,7 @@
   <p:cSld>
     <p:spTree>
       <p:nvGrpSpPr>
-        <p:cNvPr id="145" name="Shape 145"/>
+        <p:cNvPr id="147" name="Shape 147"/>
         <p:cNvGrpSpPr/>
         <p:nvPr/>
       </p:nvGrpSpPr>
@@ -7813,7 +7543,7 @@
       </p:grpSpPr>
       <p:sp>
         <p:nvSpPr>
-          <p:cNvPr id="146" name="Shape 146"/>
+          <p:cNvPr id="148" name="Shape 148"/>
           <p:cNvSpPr txBox="1"/>
           <p:nvPr>
             <p:ph type="title"/>
@@ -7842,14 +7572,14 @@
             </a:pPr>
             <a:r>
               <a:rPr lang="en"/>
-              <a:t>We Programmed It!</a:t>
+              <a:t>Results General</a:t>
             </a:r>
           </a:p>
         </p:txBody>
       </p:sp>
       <p:sp>
         <p:nvSpPr>
-          <p:cNvPr id="147" name="Shape 147"/>
+          <p:cNvPr id="149" name="Shape 149"/>
           <p:cNvSpPr txBox="1"/>
           <p:nvPr>
             <p:ph idx="1" type="body"/>
@@ -7878,8 +7608,68 @@
             </a:pPr>
             <a:r>
               <a:rPr lang="en"/>
-              <a:t>Show excerpt of our program</a:t>
-            </a:r>
+              <a:t>Costs and Benefits of randomized structure in a real example.</a:t>
+            </a:r>
+          </a:p>
+          <a:p>
+            <a:pPr rtl="0">
+              <a:spcBef>
+                <a:spcPts val="0"/>
+              </a:spcBef>
+              <a:buNone/>
+            </a:pPr>
+            <a:r>
+              <a:t/>
+            </a:r>
+            <a:endParaRPr/>
+          </a:p>
+          <a:p>
+            <a:pPr rtl="0">
+              <a:spcBef>
+                <a:spcPts val="0"/>
+              </a:spcBef>
+              <a:buNone/>
+            </a:pPr>
+            <a:r>
+              <a:rPr lang="en"/>
+              <a:t>Actual Data vs. Theoretical Benefits.</a:t>
+            </a:r>
+          </a:p>
+          <a:p>
+            <a:pPr rtl="0">
+              <a:spcBef>
+                <a:spcPts val="0"/>
+              </a:spcBef>
+              <a:buNone/>
+            </a:pPr>
+            <a:r>
+              <a:t/>
+            </a:r>
+            <a:endParaRPr/>
+          </a:p>
+          <a:p>
+            <a:pPr rtl="0">
+              <a:spcBef>
+                <a:spcPts val="0"/>
+              </a:spcBef>
+              <a:buNone/>
+            </a:pPr>
+            <a:r>
+              <a:rPr lang="en"/>
+              <a:t>Programming to help Understanding</a:t>
+            </a:r>
+          </a:p>
+          <a:p>
+            <a:pPr rtl="0">
+              <a:spcBef>
+                <a:spcPts val="0"/>
+              </a:spcBef>
+              <a:buNone/>
+            </a:pPr>
+            <a:r>
+              <a:t/>
+            </a:r>
+            <a:endParaRPr/>
           </a:p>
           <a:p>
             <a:pPr>
@@ -7890,7 +7680,7 @@
             </a:pPr>
             <a:r>
               <a:rPr lang="en"/>
-              <a:t>Explain reasoning behind deciding to actually implement program instead of simply studying it.</a:t>
+              <a:t>Results shown via Graphs</a:t>
             </a:r>
           </a:p>
         </p:txBody>
@@ -7911,7 +7701,7 @@
   <p:cSld>
     <p:spTree>
       <p:nvGrpSpPr>
-        <p:cNvPr id="151" name="Shape 151"/>
+        <p:cNvPr id="153" name="Shape 153"/>
         <p:cNvGrpSpPr/>
         <p:nvPr/>
       </p:nvGrpSpPr>
@@ -7925,7 +7715,7 @@
       </p:grpSpPr>
       <p:sp>
         <p:nvSpPr>
-          <p:cNvPr id="152" name="Shape 152"/>
+          <p:cNvPr id="154" name="Shape 154"/>
           <p:cNvSpPr txBox="1"/>
           <p:nvPr>
             <p:ph type="title"/>
@@ -7954,14 +7744,14 @@
             </a:pPr>
             <a:r>
               <a:rPr lang="en"/>
-              <a:t>Results General</a:t>
+              <a:t>Cost of Circular Operations, No Attacker</a:t>
             </a:r>
           </a:p>
         </p:txBody>
       </p:sp>
       <p:sp>
         <p:nvSpPr>
-          <p:cNvPr id="153" name="Shape 153"/>
+          <p:cNvPr id="155" name="Shape 155"/>
           <p:cNvSpPr txBox="1"/>
           <p:nvPr>
             <p:ph idx="1" type="body"/>
@@ -7990,7 +7780,7 @@
             </a:pPr>
             <a:r>
               <a:rPr lang="en"/>
-              <a:t>What tests we decided to run.</a:t>
+              <a:t>Unexpected Results for Small Data Sets</a:t>
             </a:r>
           </a:p>
           <a:p>
@@ -8001,8 +7791,56 @@
               <a:buNone/>
             </a:pPr>
             <a:r>
+              <a:t/>
+            </a:r>
+            <a:endParaRPr/>
+          </a:p>
+          <a:p>
+            <a:pPr rtl="0">
+              <a:spcBef>
+                <a:spcPts val="0"/>
+              </a:spcBef>
+              <a:buNone/>
+            </a:pPr>
+            <a:r>
               <a:rPr lang="en"/>
-              <a:t>What sample sizes worked/didn’t work.</a:t>
+              <a:t>Larger Sets with faster searches.</a:t>
+            </a:r>
+          </a:p>
+          <a:p>
+            <a:pPr rtl="0">
+              <a:spcBef>
+                <a:spcPts val="0"/>
+              </a:spcBef>
+              <a:buNone/>
+            </a:pPr>
+            <a:r>
+              <a:t/>
+            </a:r>
+            <a:endParaRPr/>
+          </a:p>
+          <a:p>
+            <a:pPr rtl="0">
+              <a:spcBef>
+                <a:spcPts val="0"/>
+              </a:spcBef>
+              <a:buNone/>
+            </a:pPr>
+            <a:r>
+              <a:rPr lang="en"/>
+              <a:t>Random Variation + Implementation quirks</a:t>
+            </a:r>
+          </a:p>
+          <a:p>
+            <a:pPr rtl="0">
+              <a:spcBef>
+                <a:spcPts val="0"/>
+              </a:spcBef>
+              <a:buNone/>
+            </a:pPr>
+            <a:r>
+              <a:rPr lang="en"/>
+              <a:t> </a:t>
             </a:r>
           </a:p>
           <a:p>
@@ -8014,7 +7852,7 @@
             </a:pPr>
             <a:r>
               <a:rPr lang="en"/>
-              <a:t>Format we are presenting our results in.</a:t>
+              <a:t>Circular 3x Slower under normal operations with no attacker</a:t>
             </a:r>
           </a:p>
         </p:txBody>
@@ -8035,7 +7873,7 @@
   <p:cSld>
     <p:spTree>
       <p:nvGrpSpPr>
-        <p:cNvPr id="157" name="Shape 157"/>
+        <p:cNvPr id="159" name="Shape 159"/>
         <p:cNvGrpSpPr/>
         <p:nvPr/>
       </p:nvGrpSpPr>
@@ -8049,7 +7887,7 @@
       </p:grpSpPr>
       <p:sp>
         <p:nvSpPr>
-          <p:cNvPr id="158" name="Shape 158"/>
+          <p:cNvPr id="160" name="Shape 160"/>
           <p:cNvSpPr txBox="1"/>
           <p:nvPr>
             <p:ph type="title"/>
@@ -8078,14 +7916,14 @@
             </a:pPr>
             <a:r>
               <a:rPr lang="en"/>
-              <a:t>Cost of Circular Operations, No Attacker</a:t>
+              <a:t>Benefits of Circular, with Attacker</a:t>
             </a:r>
           </a:p>
         </p:txBody>
       </p:sp>
       <p:sp>
         <p:nvSpPr>
-          <p:cNvPr id="159" name="Shape 159"/>
+          <p:cNvPr id="161" name="Shape 161"/>
           <p:cNvSpPr txBox="1"/>
           <p:nvPr>
             <p:ph idx="1" type="body"/>
@@ -8114,8 +7952,68 @@
             </a:pPr>
             <a:r>
               <a:rPr lang="en"/>
-              <a:t>Show the minimal added work to circular link.</a:t>
-            </a:r>
+              <a:t>Timing benefits grow as size of data set grows</a:t>
+            </a:r>
+          </a:p>
+          <a:p>
+            <a:pPr rtl="0">
+              <a:spcBef>
+                <a:spcPts val="0"/>
+              </a:spcBef>
+              <a:buNone/>
+            </a:pPr>
+            <a:r>
+              <a:t/>
+            </a:r>
+            <a:endParaRPr/>
+          </a:p>
+          <a:p>
+            <a:pPr rtl="0">
+              <a:spcBef>
+                <a:spcPts val="0"/>
+              </a:spcBef>
+              <a:buNone/>
+            </a:pPr>
+            <a:r>
+              <a:rPr lang="en"/>
+              <a:t>Worse than theoretical time but reasonable</a:t>
+            </a:r>
+          </a:p>
+          <a:p>
+            <a:pPr rtl="0">
+              <a:spcBef>
+                <a:spcPts val="0"/>
+              </a:spcBef>
+              <a:buNone/>
+            </a:pPr>
+            <a:r>
+              <a:t/>
+            </a:r>
+            <a:endParaRPr/>
+          </a:p>
+          <a:p>
+            <a:pPr rtl="0">
+              <a:spcBef>
+                <a:spcPts val="0"/>
+              </a:spcBef>
+              <a:buNone/>
+            </a:pPr>
+            <a:r>
+              <a:rPr lang="en"/>
+              <a:t>Hundreds or even Thousands of time faster when under attack.</a:t>
+            </a:r>
+          </a:p>
+          <a:p>
+            <a:pPr rtl="0">
+              <a:spcBef>
+                <a:spcPts val="0"/>
+              </a:spcBef>
+              <a:buNone/>
+            </a:pPr>
+            <a:r>
+              <a:t/>
+            </a:r>
+            <a:endParaRPr/>
           </a:p>
           <a:p>
             <a:pPr>
@@ -8125,9 +8023,9 @@
               <a:buNone/>
             </a:pPr>
             <a:r>
-              <a:rPr lang="en"/>
-              <a:t>Explain that as time goes to infinity the circular approach does not have higher big O running time.</a:t>
-            </a:r>
+              <a:t/>
+            </a:r>
+            <a:endParaRPr/>
           </a:p>
         </p:txBody>
       </p:sp>
@@ -8237,6 +8135,18 @@
               <a:buNone/>
             </a:pPr>
             <a:r>
+              <a:t/>
+            </a:r>
+            <a:endParaRPr/>
+          </a:p>
+          <a:p>
+            <a:pPr rtl="0">
+              <a:spcBef>
+                <a:spcPts val="0"/>
+              </a:spcBef>
+              <a:buNone/>
+            </a:pPr>
+            <a:r>
               <a:rPr lang="en"/>
               <a:t>Distributed Denial of Service Attacks (DDOS)</a:t>
             </a:r>
@@ -8249,9 +8159,33 @@
               <a:buNone/>
             </a:pPr>
             <a:r>
+              <a:t/>
+            </a:r>
+            <a:endParaRPr/>
+          </a:p>
+          <a:p>
+            <a:pPr rtl="0">
+              <a:spcBef>
+                <a:spcPts val="0"/>
+              </a:spcBef>
+              <a:buNone/>
+            </a:pPr>
+            <a:r>
               <a:rPr lang="en"/>
               <a:t>Algorithmic DOS</a:t>
             </a:r>
+          </a:p>
+          <a:p>
+            <a:pPr rtl="0">
+              <a:spcBef>
+                <a:spcPts val="0"/>
+              </a:spcBef>
+              <a:buNone/>
+            </a:pPr>
+            <a:r>
+              <a:t/>
+            </a:r>
+            <a:endParaRPr/>
           </a:p>
           <a:p>
             <a:pPr>
@@ -8283,7 +8217,7 @@
   <p:cSld>
     <p:spTree>
       <p:nvGrpSpPr>
-        <p:cNvPr id="163" name="Shape 163"/>
+        <p:cNvPr id="165" name="Shape 165"/>
         <p:cNvGrpSpPr/>
         <p:nvPr/>
       </p:nvGrpSpPr>
@@ -8297,7 +8231,7 @@
       </p:grpSpPr>
       <p:sp>
         <p:nvSpPr>
-          <p:cNvPr id="164" name="Shape 164"/>
+          <p:cNvPr id="166" name="Shape 166"/>
           <p:cNvSpPr txBox="1"/>
           <p:nvPr>
             <p:ph type="title"/>
@@ -8326,59 +8260,39 @@
             </a:pPr>
             <a:r>
               <a:rPr lang="en"/>
-              <a:t>Benefits of Circular, with Attacker</a:t>
+              <a:t>Results </a:t>
             </a:r>
           </a:p>
         </p:txBody>
       </p:sp>
-      <p:sp>
-        <p:nvSpPr>
-          <p:cNvPr id="165" name="Shape 165"/>
-          <p:cNvSpPr txBox="1"/>
-          <p:nvPr>
-            <p:ph idx="1" type="body"/>
-          </p:nvPr>
-        </p:nvSpPr>
-        <p:spPr>
-          <a:xfrm>
-            <a:off x="311700" y="1152475"/>
-            <a:ext cx="8520599" cy="3416400"/>
-          </a:xfrm>
-          <a:prstGeom prst="rect">
-            <a:avLst/>
-          </a:prstGeom>
-        </p:spPr>
-        <p:txBody>
-          <a:bodyPr anchorCtr="0" anchor="t" bIns="91425" lIns="91425" rIns="91425" tIns="91425">
-            <a:noAutofit/>
-          </a:bodyPr>
-          <a:lstStyle/>
-          <a:p>
-            <a:pPr rtl="0">
-              <a:spcBef>
-                <a:spcPts val="0"/>
-              </a:spcBef>
-              <a:buNone/>
-            </a:pPr>
-            <a:r>
-              <a:rPr lang="en"/>
-              <a:t>Explain trade off between the added computational time vs. the time saved from an adversary’s inability to abuse the data structure.</a:t>
-            </a:r>
-          </a:p>
-          <a:p>
-            <a:pPr>
-              <a:spcBef>
-                <a:spcPts val="0"/>
-              </a:spcBef>
-              <a:buNone/>
-            </a:pPr>
-            <a:r>
-              <a:rPr lang="en"/>
-              <a:t>Actual slide could be a two graphs, first showing the added computational time to set up circular lists, then one showing constant time of adversary performing function calls.</a:t>
-            </a:r>
-          </a:p>
-        </p:txBody>
-      </p:sp>
+      <p:pic>
+        <p:nvPicPr>
+          <p:cNvPr id="167" name="Shape 167"/>
+          <p:cNvPicPr preferRelativeResize="0"/>
+          <p:nvPr/>
+        </p:nvPicPr>
+        <p:blipFill>
+          <a:blip r:embed="rId3">
+            <a:alphaModFix/>
+          </a:blip>
+          <a:stretch>
+            <a:fillRect/>
+          </a:stretch>
+        </p:blipFill>
+        <p:spPr>
+          <a:xfrm>
+            <a:off x="2197425" y="1017719"/>
+            <a:ext cx="6347400" cy="3680875"/>
+          </a:xfrm>
+          <a:prstGeom prst="rect">
+            <a:avLst/>
+          </a:prstGeom>
+          <a:noFill/>
+          <a:ln>
+            <a:noFill/>
+          </a:ln>
+        </p:spPr>
+      </p:pic>
     </p:spTree>
   </p:cSld>
   <p:clrMapOvr>
@@ -8395,7 +8309,7 @@
   <p:cSld>
     <p:spTree>
       <p:nvGrpSpPr>
-        <p:cNvPr id="169" name="Shape 169"/>
+        <p:cNvPr id="171" name="Shape 171"/>
         <p:cNvGrpSpPr/>
         <p:nvPr/>
       </p:nvGrpSpPr>
@@ -8409,7 +8323,7 @@
       </p:grpSpPr>
       <p:sp>
         <p:nvSpPr>
-          <p:cNvPr id="170" name="Shape 170"/>
+          <p:cNvPr id="172" name="Shape 172"/>
           <p:cNvSpPr txBox="1"/>
           <p:nvPr>
             <p:ph type="title"/>
@@ -8438,47 +8352,39 @@
             </a:pPr>
             <a:r>
               <a:rPr lang="en"/>
-              <a:t>Results Vs. Expectations</a:t>
+              <a:t>Results Cont.</a:t>
             </a:r>
           </a:p>
         </p:txBody>
       </p:sp>
-      <p:sp>
-        <p:nvSpPr>
-          <p:cNvPr id="171" name="Shape 171"/>
-          <p:cNvSpPr txBox="1"/>
-          <p:nvPr>
-            <p:ph idx="1" type="body"/>
-          </p:nvPr>
-        </p:nvSpPr>
-        <p:spPr>
-          <a:xfrm>
-            <a:off x="311700" y="1152475"/>
-            <a:ext cx="8520599" cy="3416400"/>
-          </a:xfrm>
-          <a:prstGeom prst="rect">
-            <a:avLst/>
-          </a:prstGeom>
-        </p:spPr>
-        <p:txBody>
-          <a:bodyPr anchorCtr="0" anchor="t" bIns="91425" lIns="91425" rIns="91425" tIns="91425">
-            <a:noAutofit/>
-          </a:bodyPr>
-          <a:lstStyle/>
-          <a:p>
-            <a:pPr>
-              <a:spcBef>
-                <a:spcPts val="0"/>
-              </a:spcBef>
-              <a:buNone/>
-            </a:pPr>
-            <a:r>
-              <a:rPr lang="en"/>
-              <a:t>TBD</a:t>
-            </a:r>
-          </a:p>
-        </p:txBody>
-      </p:sp>
+      <p:pic>
+        <p:nvPicPr>
+          <p:cNvPr id="173" name="Shape 173"/>
+          <p:cNvPicPr preferRelativeResize="0"/>
+          <p:nvPr/>
+        </p:nvPicPr>
+        <p:blipFill>
+          <a:blip r:embed="rId3">
+            <a:alphaModFix/>
+          </a:blip>
+          <a:stretch>
+            <a:fillRect/>
+          </a:stretch>
+        </p:blipFill>
+        <p:spPr>
+          <a:xfrm>
+            <a:off x="2325175" y="1017725"/>
+            <a:ext cx="6415025" cy="3866900"/>
+          </a:xfrm>
+          <a:prstGeom prst="rect">
+            <a:avLst/>
+          </a:prstGeom>
+          <a:noFill/>
+          <a:ln>
+            <a:noFill/>
+          </a:ln>
+        </p:spPr>
+      </p:pic>
     </p:spTree>
   </p:cSld>
   <p:clrMapOvr>
@@ -8495,7 +8401,7 @@
   <p:cSld>
     <p:spTree>
       <p:nvGrpSpPr>
-        <p:cNvPr id="175" name="Shape 175"/>
+        <p:cNvPr id="177" name="Shape 177"/>
         <p:cNvGrpSpPr/>
         <p:nvPr/>
       </p:nvGrpSpPr>
@@ -8509,7 +8415,7 @@
       </p:grpSpPr>
       <p:sp>
         <p:nvSpPr>
-          <p:cNvPr id="176" name="Shape 176"/>
+          <p:cNvPr id="178" name="Shape 178"/>
           <p:cNvSpPr txBox="1"/>
           <p:nvPr>
             <p:ph type="title"/>
@@ -8538,47 +8444,39 @@
             </a:pPr>
             <a:r>
               <a:rPr lang="en"/>
-              <a:t>Results vs Expectations 2</a:t>
+              <a:t>Results Cont.</a:t>
             </a:r>
           </a:p>
         </p:txBody>
       </p:sp>
-      <p:sp>
-        <p:nvSpPr>
-          <p:cNvPr id="177" name="Shape 177"/>
-          <p:cNvSpPr txBox="1"/>
-          <p:nvPr>
-            <p:ph idx="1" type="body"/>
-          </p:nvPr>
-        </p:nvSpPr>
-        <p:spPr>
-          <a:xfrm>
-            <a:off x="311700" y="1152475"/>
-            <a:ext cx="8520599" cy="3416400"/>
-          </a:xfrm>
-          <a:prstGeom prst="rect">
-            <a:avLst/>
-          </a:prstGeom>
-        </p:spPr>
-        <p:txBody>
-          <a:bodyPr anchorCtr="0" anchor="t" bIns="91425" lIns="91425" rIns="91425" tIns="91425">
-            <a:noAutofit/>
-          </a:bodyPr>
-          <a:lstStyle/>
-          <a:p>
-            <a:pPr>
-              <a:spcBef>
-                <a:spcPts val="0"/>
-              </a:spcBef>
-              <a:buNone/>
-            </a:pPr>
-            <a:r>
-              <a:rPr lang="en"/>
-              <a:t>TBD</a:t>
-            </a:r>
-          </a:p>
-        </p:txBody>
-      </p:sp>
+      <p:pic>
+        <p:nvPicPr>
+          <p:cNvPr id="179" name="Shape 179"/>
+          <p:cNvPicPr preferRelativeResize="0"/>
+          <p:nvPr/>
+        </p:nvPicPr>
+        <p:blipFill>
+          <a:blip r:embed="rId3">
+            <a:alphaModFix/>
+          </a:blip>
+          <a:stretch>
+            <a:fillRect/>
+          </a:stretch>
+        </p:blipFill>
+        <p:spPr>
+          <a:xfrm>
+            <a:off x="2250100" y="1017725"/>
+            <a:ext cx="6464050" cy="3849749"/>
+          </a:xfrm>
+          <a:prstGeom prst="rect">
+            <a:avLst/>
+          </a:prstGeom>
+          <a:noFill/>
+          <a:ln>
+            <a:noFill/>
+          </a:ln>
+        </p:spPr>
+      </p:pic>
     </p:spTree>
   </p:cSld>
   <p:clrMapOvr>
@@ -8595,7 +8493,7 @@
   <p:cSld>
     <p:spTree>
       <p:nvGrpSpPr>
-        <p:cNvPr id="181" name="Shape 181"/>
+        <p:cNvPr id="183" name="Shape 183"/>
         <p:cNvGrpSpPr/>
         <p:nvPr/>
       </p:nvGrpSpPr>
@@ -8609,7 +8507,7 @@
       </p:grpSpPr>
       <p:sp>
         <p:nvSpPr>
-          <p:cNvPr id="182" name="Shape 182"/>
+          <p:cNvPr id="184" name="Shape 184"/>
           <p:cNvSpPr txBox="1"/>
           <p:nvPr>
             <p:ph type="title"/>
@@ -8638,14 +8536,14 @@
             </a:pPr>
             <a:r>
               <a:rPr lang="en"/>
-              <a:t>Results vs Expectations 3</a:t>
+              <a:t>Our Algorithm vs. Proposed algorithm</a:t>
             </a:r>
           </a:p>
         </p:txBody>
       </p:sp>
       <p:sp>
         <p:nvSpPr>
-          <p:cNvPr id="183" name="Shape 183"/>
+          <p:cNvPr id="185" name="Shape 185"/>
           <p:cNvSpPr txBox="1"/>
           <p:nvPr>
             <p:ph idx="1" type="body"/>
@@ -8666,6 +8564,102 @@
           </a:bodyPr>
           <a:lstStyle/>
           <a:p>
+            <a:pPr rtl="0">
+              <a:spcBef>
+                <a:spcPts val="0"/>
+              </a:spcBef>
+              <a:buNone/>
+            </a:pPr>
+            <a:r>
+              <a:rPr lang="en"/>
+              <a:t>Different Searching Methods for simplicity</a:t>
+            </a:r>
+          </a:p>
+          <a:p>
+            <a:pPr rtl="0">
+              <a:spcBef>
+                <a:spcPts val="0"/>
+              </a:spcBef>
+              <a:buNone/>
+            </a:pPr>
+            <a:r>
+              <a:t/>
+            </a:r>
+            <a:endParaRPr/>
+          </a:p>
+          <a:p>
+            <a:pPr rtl="0">
+              <a:spcBef>
+                <a:spcPts val="0"/>
+              </a:spcBef>
+              <a:buNone/>
+            </a:pPr>
+            <a:r>
+              <a:rPr lang="en"/>
+              <a:t>Tracking by offset rather than indexing</a:t>
+            </a:r>
+          </a:p>
+          <a:p>
+            <a:pPr rtl="0">
+              <a:spcBef>
+                <a:spcPts val="0"/>
+              </a:spcBef>
+              <a:buNone/>
+            </a:pPr>
+            <a:r>
+              <a:t/>
+            </a:r>
+            <a:endParaRPr/>
+          </a:p>
+          <a:p>
+            <a:pPr rtl="0">
+              <a:spcBef>
+                <a:spcPts val="0"/>
+              </a:spcBef>
+              <a:buNone/>
+            </a:pPr>
+            <a:r>
+              <a:rPr lang="en"/>
+              <a:t>Origen as element instead of constant value</a:t>
+            </a:r>
+          </a:p>
+          <a:p>
+            <a:pPr rtl="0">
+              <a:spcBef>
+                <a:spcPts val="0"/>
+              </a:spcBef>
+              <a:buNone/>
+            </a:pPr>
+            <a:r>
+              <a:t/>
+            </a:r>
+            <a:endParaRPr/>
+          </a:p>
+          <a:p>
+            <a:pPr rtl="0">
+              <a:spcBef>
+                <a:spcPts val="0"/>
+              </a:spcBef>
+              <a:buNone/>
+            </a:pPr>
+            <a:r>
+              <a:rPr lang="en"/>
+              <a:t>Slight differences in Resizing methods</a:t>
+            </a:r>
+          </a:p>
+          <a:p>
+            <a:pPr rtl="0">
+              <a:spcBef>
+                <a:spcPts val="0"/>
+              </a:spcBef>
+              <a:buNone/>
+            </a:pPr>
+            <a:r>
+              <a:t/>
+            </a:r>
+            <a:endParaRPr/>
+          </a:p>
+          <a:p>
             <a:pPr>
               <a:spcBef>
                 <a:spcPts val="0"/>
@@ -8673,9 +8667,9 @@
               <a:buNone/>
             </a:pPr>
             <a:r>
-              <a:rPr lang="en"/>
-              <a:t>TBD</a:t>
-            </a:r>
+              <a:t/>
+            </a:r>
+            <a:endParaRPr/>
           </a:p>
         </p:txBody>
       </p:sp>
@@ -8695,7 +8689,7 @@
   <p:cSld>
     <p:spTree>
       <p:nvGrpSpPr>
-        <p:cNvPr id="187" name="Shape 187"/>
+        <p:cNvPr id="189" name="Shape 189"/>
         <p:cNvGrpSpPr/>
         <p:nvPr/>
       </p:nvGrpSpPr>
@@ -8709,7 +8703,7 @@
       </p:grpSpPr>
       <p:sp>
         <p:nvSpPr>
-          <p:cNvPr id="188" name="Shape 188"/>
+          <p:cNvPr id="190" name="Shape 190"/>
           <p:cNvSpPr txBox="1"/>
           <p:nvPr>
             <p:ph type="title"/>
@@ -8738,14 +8732,14 @@
             </a:pPr>
             <a:r>
               <a:rPr lang="en"/>
-              <a:t>Our Algorithm vs. Proposed algorithm</a:t>
+              <a:t>Frustrations with Implementation</a:t>
             </a:r>
           </a:p>
         </p:txBody>
       </p:sp>
       <p:sp>
         <p:nvSpPr>
-          <p:cNvPr id="189" name="Shape 189"/>
+          <p:cNvPr id="191" name="Shape 191"/>
           <p:cNvSpPr txBox="1"/>
           <p:nvPr>
             <p:ph idx="1" type="body"/>
@@ -8766,6 +8760,78 @@
           </a:bodyPr>
           <a:lstStyle/>
           <a:p>
+            <a:pPr rtl="0">
+              <a:spcBef>
+                <a:spcPts val="0"/>
+              </a:spcBef>
+              <a:buNone/>
+            </a:pPr>
+            <a:r>
+              <a:rPr lang="en"/>
+              <a:t>Keeping track of offset through operations</a:t>
+            </a:r>
+          </a:p>
+          <a:p>
+            <a:pPr rtl="0">
+              <a:spcBef>
+                <a:spcPts val="0"/>
+              </a:spcBef>
+              <a:buNone/>
+            </a:pPr>
+            <a:r>
+              <a:t/>
+            </a:r>
+            <a:endParaRPr/>
+          </a:p>
+          <a:p>
+            <a:pPr rtl="0">
+              <a:spcBef>
+                <a:spcPts val="0"/>
+              </a:spcBef>
+              <a:buNone/>
+            </a:pPr>
+            <a:r>
+              <a:rPr lang="en"/>
+              <a:t>Keeping track of the origin</a:t>
+            </a:r>
+          </a:p>
+          <a:p>
+            <a:pPr rtl="0">
+              <a:spcBef>
+                <a:spcPts val="0"/>
+              </a:spcBef>
+              <a:buNone/>
+            </a:pPr>
+            <a:r>
+              <a:t/>
+            </a:r>
+            <a:endParaRPr/>
+          </a:p>
+          <a:p>
+            <a:pPr rtl="0">
+              <a:spcBef>
+                <a:spcPts val="0"/>
+              </a:spcBef>
+              <a:buNone/>
+            </a:pPr>
+            <a:r>
+              <a:rPr lang="en"/>
+              <a:t>Resizing in an efficient manner</a:t>
+            </a:r>
+          </a:p>
+          <a:p>
+            <a:pPr rtl="0">
+              <a:spcBef>
+                <a:spcPts val="0"/>
+              </a:spcBef>
+              <a:buNone/>
+            </a:pPr>
+            <a:r>
+              <a:t/>
+            </a:r>
+            <a:endParaRPr/>
+          </a:p>
+          <a:p>
             <a:pPr>
               <a:spcBef>
                 <a:spcPts val="0"/>
@@ -8774,7 +8840,7 @@
             </a:pPr>
             <a:r>
               <a:rPr lang="en"/>
-              <a:t>Talk about parts of algorithm that we left out by choice and the reasons for doing so.</a:t>
+              <a:t>Transferring methods from standard skip list to circular skip list.</a:t>
             </a:r>
           </a:p>
         </p:txBody>
@@ -8795,7 +8861,7 @@
   <p:cSld>
     <p:spTree>
       <p:nvGrpSpPr>
-        <p:cNvPr id="193" name="Shape 193"/>
+        <p:cNvPr id="195" name="Shape 195"/>
         <p:cNvGrpSpPr/>
         <p:nvPr/>
       </p:nvGrpSpPr>
@@ -8809,7 +8875,7 @@
       </p:grpSpPr>
       <p:sp>
         <p:nvSpPr>
-          <p:cNvPr id="194" name="Shape 194"/>
+          <p:cNvPr id="196" name="Shape 196"/>
           <p:cNvSpPr txBox="1"/>
           <p:nvPr>
             <p:ph type="title"/>
@@ -8838,14 +8904,14 @@
             </a:pPr>
             <a:r>
               <a:rPr lang="en"/>
-              <a:t>Frustrations with Implementation</a:t>
+              <a:t> Random Origen vs Circular with Known Origin</a:t>
             </a:r>
           </a:p>
         </p:txBody>
       </p:sp>
       <p:sp>
         <p:nvSpPr>
-          <p:cNvPr id="195" name="Shape 195"/>
+          <p:cNvPr id="197" name="Shape 197"/>
           <p:cNvSpPr txBox="1"/>
           <p:nvPr>
             <p:ph idx="1" type="body"/>
@@ -8874,7 +8940,55 @@
             </a:pPr>
             <a:r>
               <a:rPr lang="en"/>
-              <a:t>Changes we were forced to make due to difficulty or time.</a:t>
+              <a:t>Circular Skip Lists can still be abused </a:t>
+            </a:r>
+          </a:p>
+          <a:p>
+            <a:pPr rtl="0">
+              <a:spcBef>
+                <a:spcPts val="0"/>
+              </a:spcBef>
+              <a:buNone/>
+            </a:pPr>
+            <a:r>
+              <a:t/>
+            </a:r>
+            <a:endParaRPr/>
+          </a:p>
+          <a:p>
+            <a:pPr rtl="0">
+              <a:spcBef>
+                <a:spcPts val="0"/>
+              </a:spcBef>
+              <a:buNone/>
+            </a:pPr>
+            <a:r>
+              <a:rPr lang="en"/>
+              <a:t>Attacking nodes with larger heights</a:t>
+            </a:r>
+          </a:p>
+          <a:p>
+            <a:pPr rtl="0">
+              <a:spcBef>
+                <a:spcPts val="0"/>
+              </a:spcBef>
+              <a:buNone/>
+            </a:pPr>
+            <a:r>
+              <a:t/>
+            </a:r>
+            <a:endParaRPr/>
+          </a:p>
+          <a:p>
+            <a:pPr rtl="0">
+              <a:spcBef>
+                <a:spcPts val="0"/>
+              </a:spcBef>
+              <a:buNone/>
+            </a:pPr>
+            <a:r>
+              <a:rPr lang="en"/>
+              <a:t>Extremely difficult to accomplish but given the time</a:t>
             </a:r>
           </a:p>
           <a:p>
@@ -8886,7 +9000,7 @@
             </a:pPr>
             <a:r>
               <a:rPr lang="en"/>
-              <a:t>What we would change about our implementation strategy if we did it again.</a:t>
+              <a:t> </a:t>
             </a:r>
           </a:p>
         </p:txBody>
@@ -8907,7 +9021,7 @@
   <p:cSld>
     <p:spTree>
       <p:nvGrpSpPr>
-        <p:cNvPr id="199" name="Shape 199"/>
+        <p:cNvPr id="201" name="Shape 201"/>
         <p:cNvGrpSpPr/>
         <p:nvPr/>
       </p:nvGrpSpPr>
@@ -8921,7 +9035,7 @@
       </p:grpSpPr>
       <p:sp>
         <p:nvSpPr>
-          <p:cNvPr id="200" name="Shape 200"/>
+          <p:cNvPr id="202" name="Shape 202"/>
           <p:cNvSpPr txBox="1"/>
           <p:nvPr>
             <p:ph type="title"/>
@@ -8950,59 +9064,39 @@
             </a:pPr>
             <a:r>
               <a:rPr lang="en"/>
-              <a:t> Random Origen vs Standard Random Height List</a:t>
+              <a:t>The Equation Necessary</a:t>
             </a:r>
           </a:p>
         </p:txBody>
       </p:sp>
-      <p:sp>
-        <p:nvSpPr>
-          <p:cNvPr id="201" name="Shape 201"/>
-          <p:cNvSpPr txBox="1"/>
-          <p:nvPr>
-            <p:ph idx="1" type="body"/>
-          </p:nvPr>
-        </p:nvSpPr>
-        <p:spPr>
-          <a:xfrm>
-            <a:off x="311700" y="1152475"/>
-            <a:ext cx="8520599" cy="3416400"/>
-          </a:xfrm>
-          <a:prstGeom prst="rect">
-            <a:avLst/>
-          </a:prstGeom>
-        </p:spPr>
-        <p:txBody>
-          <a:bodyPr anchorCtr="0" anchor="t" bIns="91425" lIns="91425" rIns="91425" tIns="91425">
-            <a:noAutofit/>
-          </a:bodyPr>
-          <a:lstStyle/>
-          <a:p>
-            <a:pPr rtl="0">
-              <a:spcBef>
-                <a:spcPts val="0"/>
-              </a:spcBef>
-              <a:buNone/>
-            </a:pPr>
-            <a:r>
-              <a:rPr lang="en"/>
-              <a:t>Clarify the importance of choosing an origin at random.</a:t>
-            </a:r>
-          </a:p>
-          <a:p>
-            <a:pPr>
-              <a:spcBef>
-                <a:spcPts val="0"/>
-              </a:spcBef>
-              <a:buNone/>
-            </a:pPr>
-            <a:r>
-              <a:rPr lang="en"/>
-              <a:t>Regardless of other precautions taken without random origin the timing still can become predictable.</a:t>
-            </a:r>
-          </a:p>
-        </p:txBody>
-      </p:sp>
+      <p:pic>
+        <p:nvPicPr>
+          <p:cNvPr id="203" name="Shape 203"/>
+          <p:cNvPicPr preferRelativeResize="0"/>
+          <p:nvPr/>
+        </p:nvPicPr>
+        <p:blipFill>
+          <a:blip r:embed="rId3">
+            <a:alphaModFix/>
+          </a:blip>
+          <a:stretch>
+            <a:fillRect/>
+          </a:stretch>
+        </p:blipFill>
+        <p:spPr>
+          <a:xfrm>
+            <a:off x="225550" y="1649216"/>
+            <a:ext cx="8692900" cy="1606458"/>
+          </a:xfrm>
+          <a:prstGeom prst="rect">
+            <a:avLst/>
+          </a:prstGeom>
+          <a:noFill/>
+          <a:ln>
+            <a:noFill/>
+          </a:ln>
+        </p:spPr>
+      </p:pic>
     </p:spTree>
   </p:cSld>
   <p:clrMapOvr>
@@ -9019,7 +9113,7 @@
   <p:cSld>
     <p:spTree>
       <p:nvGrpSpPr>
-        <p:cNvPr id="205" name="Shape 205"/>
+        <p:cNvPr id="207" name="Shape 207"/>
         <p:cNvGrpSpPr/>
         <p:nvPr/>
       </p:nvGrpSpPr>
@@ -9033,7 +9127,7 @@
       </p:grpSpPr>
       <p:sp>
         <p:nvSpPr>
-          <p:cNvPr id="206" name="Shape 206"/>
+          <p:cNvPr id="208" name="Shape 208"/>
           <p:cNvSpPr txBox="1"/>
           <p:nvPr>
             <p:ph type="title"/>
@@ -9062,14 +9156,14 @@
             </a:pPr>
             <a:r>
               <a:rPr lang="en"/>
-              <a:t>The Equation</a:t>
+              <a:t>Summary</a:t>
             </a:r>
           </a:p>
         </p:txBody>
       </p:sp>
       <p:sp>
         <p:nvSpPr>
-          <p:cNvPr id="207" name="Shape 207"/>
+          <p:cNvPr id="209" name="Shape 209"/>
           <p:cNvSpPr txBox="1"/>
           <p:nvPr>
             <p:ph idx="1" type="body"/>
@@ -9090,18 +9184,6 @@
           </a:bodyPr>
           <a:lstStyle/>
           <a:p>
-            <a:pPr rtl="0">
-              <a:spcBef>
-                <a:spcPts val="0"/>
-              </a:spcBef>
-              <a:buNone/>
-            </a:pPr>
-            <a:r>
-              <a:rPr lang="en"/>
-              <a:t>Show the equation and explain that this is the method a normal circular skip list could be abused. </a:t>
-            </a:r>
-          </a:p>
-          <a:p>
             <a:pPr>
               <a:spcBef>
                 <a:spcPts val="0"/>
@@ -9109,9 +9191,9 @@
               <a:buNone/>
             </a:pPr>
             <a:r>
-              <a:rPr lang="en"/>
-              <a:t>Articulate the clear difficulty in creating and solving the equation but also stress the fact that given the time and intelligence it could be done.</a:t>
-            </a:r>
+              <a:t/>
+            </a:r>
+            <a:endParaRPr/>
           </a:p>
         </p:txBody>
       </p:sp>
@@ -9131,7 +9213,7 @@
   <p:cSld>
     <p:spTree>
       <p:nvGrpSpPr>
-        <p:cNvPr id="211" name="Shape 211"/>
+        <p:cNvPr id="213" name="Shape 213"/>
         <p:cNvGrpSpPr/>
         <p:nvPr/>
       </p:nvGrpSpPr>
@@ -9145,7 +9227,7 @@
       </p:grpSpPr>
       <p:sp>
         <p:nvSpPr>
-          <p:cNvPr id="212" name="Shape 212"/>
+          <p:cNvPr id="214" name="Shape 214"/>
           <p:cNvSpPr txBox="1"/>
           <p:nvPr>
             <p:ph type="title"/>
@@ -9174,14 +9256,14 @@
             </a:pPr>
             <a:r>
               <a:rPr lang="en"/>
-              <a:t>Summary</a:t>
+              <a:t>What we wanted to do, but didn’t</a:t>
             </a:r>
           </a:p>
         </p:txBody>
       </p:sp>
       <p:sp>
         <p:nvSpPr>
-          <p:cNvPr id="213" name="Shape 213"/>
+          <p:cNvPr id="215" name="Shape 215"/>
           <p:cNvSpPr txBox="1"/>
           <p:nvPr>
             <p:ph idx="1" type="body"/>
@@ -9202,6 +9284,54 @@
           </a:bodyPr>
           <a:lstStyle/>
           <a:p>
+            <a:pPr rtl="0">
+              <a:spcBef>
+                <a:spcPts val="0"/>
+              </a:spcBef>
+              <a:buNone/>
+            </a:pPr>
+            <a:r>
+              <a:rPr lang="en"/>
+              <a:t>Random normal skip lists.</a:t>
+            </a:r>
+          </a:p>
+          <a:p>
+            <a:pPr rtl="0">
+              <a:spcBef>
+                <a:spcPts val="0"/>
+              </a:spcBef>
+              <a:buNone/>
+            </a:pPr>
+            <a:r>
+              <a:t/>
+            </a:r>
+            <a:endParaRPr/>
+          </a:p>
+          <a:p>
+            <a:pPr rtl="0">
+              <a:spcBef>
+                <a:spcPts val="0"/>
+              </a:spcBef>
+              <a:buNone/>
+            </a:pPr>
+            <a:r>
+              <a:rPr lang="en"/>
+              <a:t>Analyze timing of Random Circular vs Random Normal</a:t>
+            </a:r>
+          </a:p>
+          <a:p>
+            <a:pPr rtl="0">
+              <a:spcBef>
+                <a:spcPts val="0"/>
+              </a:spcBef>
+              <a:buNone/>
+            </a:pPr>
+            <a:r>
+              <a:t/>
+            </a:r>
+            <a:endParaRPr/>
+          </a:p>
+          <a:p>
             <a:pPr>
               <a:spcBef>
                 <a:spcPts val="0"/>
@@ -9209,9 +9339,9 @@
               <a:buNone/>
             </a:pPr>
             <a:r>
-              <a:t/>
-            </a:r>
-            <a:endParaRPr/>
+              <a:rPr lang="en"/>
+              <a:t>Bring our implementation closer to theoretical implementation in paper.</a:t>
+            </a:r>
           </a:p>
         </p:txBody>
       </p:sp>
@@ -9231,7 +9361,7 @@
   <p:cSld>
     <p:spTree>
       <p:nvGrpSpPr>
-        <p:cNvPr id="217" name="Shape 217"/>
+        <p:cNvPr id="219" name="Shape 219"/>
         <p:cNvGrpSpPr/>
         <p:nvPr/>
       </p:nvGrpSpPr>
@@ -9245,7 +9375,7 @@
       </p:grpSpPr>
       <p:sp>
         <p:nvSpPr>
-          <p:cNvPr id="218" name="Shape 218"/>
+          <p:cNvPr id="220" name="Shape 220"/>
           <p:cNvSpPr txBox="1"/>
           <p:nvPr>
             <p:ph type="title"/>
@@ -9274,14 +9404,14 @@
             </a:pPr>
             <a:r>
               <a:rPr lang="en"/>
-              <a:t>What we wanted to do, but didn’t</a:t>
+              <a:t>Further Research on Subject</a:t>
             </a:r>
           </a:p>
         </p:txBody>
       </p:sp>
       <p:sp>
         <p:nvSpPr>
-          <p:cNvPr id="219" name="Shape 219"/>
+          <p:cNvPr id="221" name="Shape 221"/>
           <p:cNvSpPr txBox="1"/>
           <p:nvPr>
             <p:ph idx="1" type="body"/>
@@ -9302,6 +9432,54 @@
           </a:bodyPr>
           <a:lstStyle/>
           <a:p>
+            <a:pPr rtl="0">
+              <a:spcBef>
+                <a:spcPts val="0"/>
+              </a:spcBef>
+              <a:buNone/>
+            </a:pPr>
+            <a:r>
+              <a:rPr lang="en"/>
+              <a:t>Testing similar implementation methods with other data structures, for example a Binary tree.</a:t>
+            </a:r>
+          </a:p>
+          <a:p>
+            <a:pPr rtl="0">
+              <a:spcBef>
+                <a:spcPts val="0"/>
+              </a:spcBef>
+              <a:buNone/>
+            </a:pPr>
+            <a:r>
+              <a:t/>
+            </a:r>
+            <a:endParaRPr/>
+          </a:p>
+          <a:p>
+            <a:pPr rtl="0">
+              <a:spcBef>
+                <a:spcPts val="0"/>
+              </a:spcBef>
+              <a:buNone/>
+            </a:pPr>
+            <a:r>
+              <a:rPr lang="en"/>
+              <a:t>Finding new implementation methods that can help with timing unpredictability.</a:t>
+            </a:r>
+          </a:p>
+          <a:p>
+            <a:pPr rtl="0">
+              <a:spcBef>
+                <a:spcPts val="0"/>
+              </a:spcBef>
+              <a:buNone/>
+            </a:pPr>
+            <a:r>
+              <a:t/>
+            </a:r>
+            <a:endParaRPr/>
+          </a:p>
+          <a:p>
             <a:pPr>
               <a:spcBef>
                 <a:spcPts val="0"/>
@@ -9309,9 +9487,9 @@
               <a:buNone/>
             </a:pPr>
             <a:r>
-              <a:t/>
-            </a:r>
-            <a:endParaRPr/>
+              <a:rPr lang="en"/>
+              <a:t>Exploring real life applications for the concept.</a:t>
+            </a:r>
           </a:p>
         </p:txBody>
       </p:sp>
@@ -9374,7 +9552,7 @@
             </a:pPr>
             <a:r>
               <a:rPr lang="en"/>
-              <a:t>Background 2</a:t>
+              <a:t>Background Cont.</a:t>
             </a:r>
           </a:p>
         </p:txBody>
@@ -9421,6 +9599,18 @@
               <a:buNone/>
             </a:pPr>
             <a:r>
+              <a:t/>
+            </a:r>
+            <a:endParaRPr/>
+          </a:p>
+          <a:p>
+            <a:pPr rtl="0">
+              <a:spcBef>
+                <a:spcPts val="0"/>
+              </a:spcBef>
+              <a:buNone/>
+            </a:pPr>
+            <a:r>
               <a:rPr lang="en"/>
               <a:t>Adaptability</a:t>
             </a:r>
@@ -9433,6 +9623,18 @@
               <a:buNone/>
             </a:pPr>
             <a:r>
+              <a:t/>
+            </a:r>
+            <a:endParaRPr/>
+          </a:p>
+          <a:p>
+            <a:pPr rtl="0">
+              <a:spcBef>
+                <a:spcPts val="0"/>
+              </a:spcBef>
+              <a:buNone/>
+            </a:pPr>
+            <a:r>
               <a:rPr lang="en"/>
               <a:t>Running time must be reasonable.</a:t>
             </a:r>
@@ -9445,6 +9647,18 @@
               <a:buNone/>
             </a:pPr>
             <a:r>
+              <a:t/>
+            </a:r>
+            <a:endParaRPr/>
+          </a:p>
+          <a:p>
+            <a:pPr rtl="0">
+              <a:spcBef>
+                <a:spcPts val="0"/>
+              </a:spcBef>
+              <a:buNone/>
+            </a:pPr>
+            <a:r>
               <a:rPr lang="en"/>
               <a:t>Assume the Attacker knows the data structure and has unlimited function calls..</a:t>
             </a:r>
@@ -9460,118 +9674,6 @@
               <a:t/>
             </a:r>
             <a:endParaRPr/>
-          </a:p>
-        </p:txBody>
-      </p:sp>
-    </p:spTree>
-  </p:cSld>
-  <p:clrMapOvr>
-    <a:masterClrMapping/>
-  </p:clrMapOvr>
-  <p:transition spd="slow">
-    <p:cut/>
-  </p:transition>
-</p:sld>
-</file>
-
-<file path=ppt/slides/slide30.xml><?xml version="1.0" encoding="utf-8"?>
-<p:sld xmlns:a="http://schemas.openxmlformats.org/drawingml/2006/main" xmlns:r="http://schemas.openxmlformats.org/officeDocument/2006/relationships" xmlns:mc="http://schemas.openxmlformats.org/markup-compatibility/2006" xmlns:mv="urn:schemas-microsoft-com:mac:vml" xmlns:p="http://schemas.openxmlformats.org/presentationml/2006/main" xmlns:c="http://schemas.openxmlformats.org/drawingml/2006/chart" xmlns:dgm="http://schemas.openxmlformats.org/drawingml/2006/diagram" xmlns:o="urn:schemas-microsoft-com:office:office" xmlns:v="urn:schemas-microsoft-com:vml" xmlns:pvml="urn:schemas-microsoft-com:office:powerpoint" xmlns:com="http://schemas.openxmlformats.org/drawingml/2006/compatibility" xmlns:p14="http://schemas.microsoft.com/office/powerpoint/2010/main">
-  <p:cSld>
-    <p:spTree>
-      <p:nvGrpSpPr>
-        <p:cNvPr id="223" name="Shape 223"/>
-        <p:cNvGrpSpPr/>
-        <p:nvPr/>
-      </p:nvGrpSpPr>
-      <p:grpSpPr>
-        <a:xfrm>
-          <a:off x="0" y="0"/>
-          <a:ext cx="0" cy="0"/>
-          <a:chOff x="0" y="0"/>
-          <a:chExt cx="0" cy="0"/>
-        </a:xfrm>
-      </p:grpSpPr>
-      <p:sp>
-        <p:nvSpPr>
-          <p:cNvPr id="224" name="Shape 224"/>
-          <p:cNvSpPr txBox="1"/>
-          <p:nvPr>
-            <p:ph type="title"/>
-          </p:nvPr>
-        </p:nvSpPr>
-        <p:spPr>
-          <a:xfrm>
-            <a:off x="311700" y="445025"/>
-            <a:ext cx="8520599" cy="572699"/>
-          </a:xfrm>
-          <a:prstGeom prst="rect">
-            <a:avLst/>
-          </a:prstGeom>
-        </p:spPr>
-        <p:txBody>
-          <a:bodyPr anchorCtr="0" anchor="t" bIns="91425" lIns="91425" rIns="91425" tIns="91425">
-            <a:noAutofit/>
-          </a:bodyPr>
-          <a:lstStyle/>
-          <a:p>
-            <a:pPr>
-              <a:spcBef>
-                <a:spcPts val="0"/>
-              </a:spcBef>
-              <a:buNone/>
-            </a:pPr>
-            <a:r>
-              <a:rPr lang="en"/>
-              <a:t>Further Research on Subject</a:t>
-            </a:r>
-          </a:p>
-        </p:txBody>
-      </p:sp>
-      <p:sp>
-        <p:nvSpPr>
-          <p:cNvPr id="225" name="Shape 225"/>
-          <p:cNvSpPr txBox="1"/>
-          <p:nvPr>
-            <p:ph idx="1" type="body"/>
-          </p:nvPr>
-        </p:nvSpPr>
-        <p:spPr>
-          <a:xfrm>
-            <a:off x="311700" y="1152475"/>
-            <a:ext cx="8520599" cy="3416400"/>
-          </a:xfrm>
-          <a:prstGeom prst="rect">
-            <a:avLst/>
-          </a:prstGeom>
-        </p:spPr>
-        <p:txBody>
-          <a:bodyPr anchorCtr="0" anchor="t" bIns="91425" lIns="91425" rIns="91425" tIns="91425">
-            <a:noAutofit/>
-          </a:bodyPr>
-          <a:lstStyle/>
-          <a:p>
-            <a:pPr rtl="0">
-              <a:spcBef>
-                <a:spcPts val="0"/>
-              </a:spcBef>
-              <a:buNone/>
-            </a:pPr>
-            <a:r>
-              <a:rPr lang="en"/>
-              <a:t>Testing similar implementation methods with other data structures.</a:t>
-            </a:r>
-          </a:p>
-          <a:p>
-            <a:pPr>
-              <a:spcBef>
-                <a:spcPts val="0"/>
-              </a:spcBef>
-              <a:buNone/>
-            </a:pPr>
-            <a:r>
-              <a:rPr lang="en"/>
-              <a:t>Finding new implementation methods that can help with timing unpredictability.</a:t>
-            </a:r>
           </a:p>
         </p:txBody>
       </p:sp>
@@ -9699,6 +9801,34 @@
           </a:p>
         </p:txBody>
       </p:sp>
+      <p:pic>
+        <p:nvPicPr>
+          <p:cNvPr id="70" name="Shape 70"/>
+          <p:cNvPicPr preferRelativeResize="0"/>
+          <p:nvPr/>
+        </p:nvPicPr>
+        <p:blipFill>
+          <a:blip r:embed="rId3">
+            <a:alphaModFix/>
+          </a:blip>
+          <a:stretch>
+            <a:fillRect/>
+          </a:stretch>
+        </p:blipFill>
+        <p:spPr>
+          <a:xfrm>
+            <a:off x="2387150" y="2318400"/>
+            <a:ext cx="6323949" cy="2329875"/>
+          </a:xfrm>
+          <a:prstGeom prst="rect">
+            <a:avLst/>
+          </a:prstGeom>
+          <a:noFill/>
+          <a:ln>
+            <a:noFill/>
+          </a:ln>
+        </p:spPr>
+      </p:pic>
     </p:spTree>
   </p:cSld>
   <p:clrMapOvr>
@@ -9715,7 +9845,7 @@
   <p:cSld>
     <p:spTree>
       <p:nvGrpSpPr>
-        <p:cNvPr id="73" name="Shape 73"/>
+        <p:cNvPr id="74" name="Shape 74"/>
         <p:cNvGrpSpPr/>
         <p:nvPr/>
       </p:nvGrpSpPr>
@@ -9729,7 +9859,7 @@
       </p:grpSpPr>
       <p:sp>
         <p:nvSpPr>
-          <p:cNvPr id="74" name="Shape 74"/>
+          <p:cNvPr id="75" name="Shape 75"/>
           <p:cNvSpPr txBox="1"/>
           <p:nvPr>
             <p:ph type="title"/>
@@ -9765,7 +9895,7 @@
       </p:sp>
       <p:sp>
         <p:nvSpPr>
-          <p:cNvPr id="75" name="Shape 75"/>
+          <p:cNvPr id="76" name="Shape 76"/>
           <p:cNvSpPr txBox="1"/>
           <p:nvPr>
             <p:ph idx="1" type="body"/>
@@ -9818,7 +9948,7 @@
             </a:pPr>
             <a:r>
               <a:rPr lang="en"/>
-              <a:t>Randomizing Origin after function calls.</a:t>
+              <a:t>Randomizing Origin </a:t>
             </a:r>
           </a:p>
           <a:p>
@@ -9835,6 +9965,34 @@
           </a:p>
         </p:txBody>
       </p:sp>
+      <p:pic>
+        <p:nvPicPr>
+          <p:cNvPr id="77" name="Shape 77"/>
+          <p:cNvPicPr preferRelativeResize="0"/>
+          <p:nvPr/>
+        </p:nvPicPr>
+        <p:blipFill>
+          <a:blip r:embed="rId3">
+            <a:alphaModFix/>
+          </a:blip>
+          <a:stretch>
+            <a:fillRect/>
+          </a:stretch>
+        </p:blipFill>
+        <p:spPr>
+          <a:xfrm>
+            <a:off x="2599525" y="2239000"/>
+            <a:ext cx="6323950" cy="2329875"/>
+          </a:xfrm>
+          <a:prstGeom prst="rect">
+            <a:avLst/>
+          </a:prstGeom>
+          <a:noFill/>
+          <a:ln>
+            <a:noFill/>
+          </a:ln>
+        </p:spPr>
+      </p:pic>
     </p:spTree>
   </p:cSld>
   <p:clrMapOvr>
@@ -9851,7 +10009,7 @@
   <p:cSld>
     <p:spTree>
       <p:nvGrpSpPr>
-        <p:cNvPr id="79" name="Shape 79"/>
+        <p:cNvPr id="81" name="Shape 81"/>
         <p:cNvGrpSpPr/>
         <p:nvPr/>
       </p:nvGrpSpPr>
@@ -9865,7 +10023,7 @@
       </p:grpSpPr>
       <p:sp>
         <p:nvSpPr>
-          <p:cNvPr id="80" name="Shape 80"/>
+          <p:cNvPr id="82" name="Shape 82"/>
           <p:cNvSpPr txBox="1"/>
           <p:nvPr>
             <p:ph type="title"/>
@@ -9894,14 +10052,14 @@
             </a:pPr>
             <a:r>
               <a:rPr lang="en"/>
-              <a:t>History</a:t>
+              <a:t>Benefits</a:t>
             </a:r>
           </a:p>
         </p:txBody>
       </p:sp>
       <p:sp>
         <p:nvSpPr>
-          <p:cNvPr id="81" name="Shape 81"/>
+          <p:cNvPr id="83" name="Shape 83"/>
           <p:cNvSpPr txBox="1"/>
           <p:nvPr>
             <p:ph idx="1" type="body"/>
@@ -9922,6 +10080,54 @@
           </a:bodyPr>
           <a:lstStyle/>
           <a:p>
+            <a:pPr rtl="0">
+              <a:spcBef>
+                <a:spcPts val="0"/>
+              </a:spcBef>
+              <a:buNone/>
+            </a:pPr>
+            <a:r>
+              <a:rPr lang="en"/>
+              <a:t>Retains Efficiency</a:t>
+            </a:r>
+          </a:p>
+          <a:p>
+            <a:pPr rtl="0">
+              <a:spcBef>
+                <a:spcPts val="0"/>
+              </a:spcBef>
+              <a:buNone/>
+            </a:pPr>
+            <a:r>
+              <a:t/>
+            </a:r>
+            <a:endParaRPr/>
+          </a:p>
+          <a:p>
+            <a:pPr rtl="0">
+              <a:spcBef>
+                <a:spcPts val="0"/>
+              </a:spcBef>
+              <a:buNone/>
+            </a:pPr>
+            <a:r>
+              <a:rPr lang="en"/>
+              <a:t>Untrackable Probability Distribution</a:t>
+            </a:r>
+          </a:p>
+          <a:p>
+            <a:pPr rtl="0">
+              <a:spcBef>
+                <a:spcPts val="0"/>
+              </a:spcBef>
+              <a:buNone/>
+            </a:pPr>
+            <a:r>
+              <a:t/>
+            </a:r>
+            <a:endParaRPr/>
+          </a:p>
+          <a:p>
             <a:pPr>
               <a:spcBef>
                 <a:spcPts val="0"/>
@@ -9930,7 +10136,7 @@
             </a:pPr>
             <a:r>
               <a:rPr lang="en"/>
-              <a:t>TBD maybe delete this slide?</a:t>
+              <a:t>Unpredictable even under attack.</a:t>
             </a:r>
           </a:p>
         </p:txBody>
@@ -9951,7 +10157,7 @@
   <p:cSld>
     <p:spTree>
       <p:nvGrpSpPr>
-        <p:cNvPr id="85" name="Shape 85"/>
+        <p:cNvPr id="87" name="Shape 87"/>
         <p:cNvGrpSpPr/>
         <p:nvPr/>
       </p:nvGrpSpPr>
@@ -9965,7 +10171,7 @@
       </p:grpSpPr>
       <p:sp>
         <p:nvSpPr>
-          <p:cNvPr id="86" name="Shape 86"/>
+          <p:cNvPr id="88" name="Shape 88"/>
           <p:cNvSpPr txBox="1"/>
           <p:nvPr>
             <p:ph type="title"/>
@@ -9994,67 +10200,7 @@
             </a:pPr>
             <a:r>
               <a:rPr lang="en"/>
-              <a:t>Benefits</a:t>
-            </a:r>
-          </a:p>
-        </p:txBody>
-      </p:sp>
-      <p:sp>
-        <p:nvSpPr>
-          <p:cNvPr id="87" name="Shape 87"/>
-          <p:cNvSpPr txBox="1"/>
-          <p:nvPr>
-            <p:ph idx="1" type="body"/>
-          </p:nvPr>
-        </p:nvSpPr>
-        <p:spPr>
-          <a:xfrm>
-            <a:off x="311700" y="1152475"/>
-            <a:ext cx="8520599" cy="3416400"/>
-          </a:xfrm>
-          <a:prstGeom prst="rect">
-            <a:avLst/>
-          </a:prstGeom>
-        </p:spPr>
-        <p:txBody>
-          <a:bodyPr anchorCtr="0" anchor="t" bIns="91425" lIns="91425" rIns="91425" tIns="91425">
-            <a:noAutofit/>
-          </a:bodyPr>
-          <a:lstStyle/>
-          <a:p>
-            <a:pPr rtl="0">
-              <a:spcBef>
-                <a:spcPts val="0"/>
-              </a:spcBef>
-              <a:buNone/>
-            </a:pPr>
-            <a:r>
-              <a:rPr lang="en"/>
-              <a:t>Retains Efficiency</a:t>
-            </a:r>
-          </a:p>
-          <a:p>
-            <a:pPr rtl="0">
-              <a:spcBef>
-                <a:spcPts val="0"/>
-              </a:spcBef>
-              <a:buNone/>
-            </a:pPr>
-            <a:r>
-              <a:rPr lang="en"/>
-              <a:t>Untrackable Probability Distribution</a:t>
-            </a:r>
-          </a:p>
-          <a:p>
-            <a:pPr>
-              <a:spcBef>
-                <a:spcPts val="0"/>
-              </a:spcBef>
-              <a:buNone/>
-            </a:pPr>
-            <a:r>
-              <a:rPr lang="en"/>
-              <a:t>Unpredictable!</a:t>
+              <a:t>Visualization</a:t>
             </a:r>
           </a:p>
         </p:txBody>
@@ -10075,7 +10221,7 @@
   <p:cSld>
     <p:spTree>
       <p:nvGrpSpPr>
-        <p:cNvPr id="91" name="Shape 91"/>
+        <p:cNvPr id="92" name="Shape 92"/>
         <p:cNvGrpSpPr/>
         <p:nvPr/>
       </p:nvGrpSpPr>
@@ -10089,7 +10235,7 @@
       </p:grpSpPr>
       <p:sp>
         <p:nvSpPr>
-          <p:cNvPr id="92" name="Shape 92"/>
+          <p:cNvPr id="93" name="Shape 93"/>
           <p:cNvSpPr txBox="1"/>
           <p:nvPr>
             <p:ph type="title"/>
@@ -10118,14 +10264,14 @@
             </a:pPr>
             <a:r>
               <a:rPr lang="en"/>
-              <a:t>Visualization Start</a:t>
+              <a:t>List of Operations</a:t>
             </a:r>
           </a:p>
         </p:txBody>
       </p:sp>
       <p:sp>
         <p:nvSpPr>
-          <p:cNvPr id="93" name="Shape 93"/>
+          <p:cNvPr id="94" name="Shape 94"/>
           <p:cNvSpPr txBox="1"/>
           <p:nvPr>
             <p:ph idx="1" type="body"/>
@@ -10154,7 +10300,43 @@
             </a:pPr>
             <a:r>
               <a:rPr lang="en"/>
-              <a:t>Show the small size data set being used.</a:t>
+              <a:t>Insertion</a:t>
+            </a:r>
+          </a:p>
+          <a:p>
+            <a:pPr rtl="0">
+              <a:spcBef>
+                <a:spcPts val="0"/>
+              </a:spcBef>
+              <a:buNone/>
+            </a:pPr>
+            <a:r>
+              <a:rPr lang="en"/>
+              <a:t>Deletion</a:t>
+            </a:r>
+          </a:p>
+          <a:p>
+            <a:pPr rtl="0">
+              <a:spcBef>
+                <a:spcPts val="0"/>
+              </a:spcBef>
+              <a:buNone/>
+            </a:pPr>
+            <a:r>
+              <a:rPr lang="en"/>
+              <a:t>Search</a:t>
+            </a:r>
+          </a:p>
+          <a:p>
+            <a:pPr rtl="0">
+              <a:spcBef>
+                <a:spcPts val="0"/>
+              </a:spcBef>
+              <a:buNone/>
+            </a:pPr>
+            <a:r>
+              <a:rPr lang="en"/>
+              <a:t>Change Height</a:t>
             </a:r>
           </a:p>
           <a:p>
@@ -10166,7 +10348,7 @@
             </a:pPr>
             <a:r>
               <a:rPr lang="en"/>
-              <a:t>Show the start state of both Circular Skip List and Regular Skip List</a:t>
+              <a:t>Change Origin</a:t>
             </a:r>
           </a:p>
         </p:txBody>
@@ -10187,7 +10369,7 @@
   <p:cSld>
     <p:spTree>
       <p:nvGrpSpPr>
-        <p:cNvPr id="97" name="Shape 97"/>
+        <p:cNvPr id="98" name="Shape 98"/>
         <p:cNvGrpSpPr/>
         <p:nvPr/>
       </p:nvGrpSpPr>
@@ -10201,7 +10383,7 @@
       </p:grpSpPr>
       <p:sp>
         <p:nvSpPr>
-          <p:cNvPr id="98" name="Shape 98"/>
+          <p:cNvPr id="99" name="Shape 99"/>
           <p:cNvSpPr txBox="1"/>
           <p:nvPr>
             <p:ph type="title"/>
@@ -10230,95 +10412,39 @@
             </a:pPr>
             <a:r>
               <a:rPr lang="en"/>
-              <a:t>List of Operations</a:t>
+              <a:t>Add Circular</a:t>
             </a:r>
           </a:p>
         </p:txBody>
       </p:sp>
-      <p:sp>
-        <p:nvSpPr>
-          <p:cNvPr id="99" name="Shape 99"/>
-          <p:cNvSpPr txBox="1"/>
-          <p:nvPr>
-            <p:ph idx="1" type="body"/>
-          </p:nvPr>
-        </p:nvSpPr>
-        <p:spPr>
-          <a:xfrm>
-            <a:off x="311700" y="1152475"/>
-            <a:ext cx="8520599" cy="3416400"/>
-          </a:xfrm>
-          <a:prstGeom prst="rect">
-            <a:avLst/>
-          </a:prstGeom>
-        </p:spPr>
-        <p:txBody>
-          <a:bodyPr anchorCtr="0" anchor="t" bIns="91425" lIns="91425" rIns="91425" tIns="91425">
-            <a:noAutofit/>
-          </a:bodyPr>
-          <a:lstStyle/>
-          <a:p>
-            <a:pPr rtl="0">
-              <a:spcBef>
-                <a:spcPts val="0"/>
-              </a:spcBef>
-              <a:buNone/>
-            </a:pPr>
-            <a:r>
-              <a:rPr lang="en"/>
-              <a:t>Insertion</a:t>
-            </a:r>
-          </a:p>
-          <a:p>
-            <a:pPr rtl="0">
-              <a:spcBef>
-                <a:spcPts val="0"/>
-              </a:spcBef>
-              <a:buNone/>
-            </a:pPr>
-            <a:r>
-              <a:rPr lang="en"/>
-              <a:t>Deletion</a:t>
-            </a:r>
-          </a:p>
-          <a:p>
-            <a:pPr rtl="0">
-              <a:spcBef>
-                <a:spcPts val="0"/>
-              </a:spcBef>
-              <a:buNone/>
-            </a:pPr>
-            <a:r>
-              <a:rPr lang="en"/>
-              <a:t>Search</a:t>
-            </a:r>
-          </a:p>
-          <a:p>
-            <a:pPr rtl="0">
-              <a:spcBef>
-                <a:spcPts val="0"/>
-              </a:spcBef>
-              <a:buNone/>
-            </a:pPr>
-            <a:r>
-              <a:rPr lang="en"/>
-              <a:t>Change Height</a:t>
-            </a:r>
-          </a:p>
-          <a:p>
-            <a:pPr>
-              <a:spcBef>
-                <a:spcPts val="0"/>
-              </a:spcBef>
-              <a:buNone/>
-            </a:pPr>
-            <a:r>
-              <a:rPr lang="en"/>
-              <a:t>Change Origin</a:t>
-            </a:r>
-          </a:p>
-        </p:txBody>
-      </p:sp>
+      <p:pic>
+        <p:nvPicPr>
+          <p:cNvPr id="100" name="Shape 100"/>
+          <p:cNvPicPr preferRelativeResize="0"/>
+          <p:nvPr/>
+        </p:nvPicPr>
+        <p:blipFill>
+          <a:blip r:embed="rId3">
+            <a:alphaModFix/>
+          </a:blip>
+          <a:stretch>
+            <a:fillRect/>
+          </a:stretch>
+        </p:blipFill>
+        <p:spPr>
+          <a:xfrm>
+            <a:off x="3057100" y="82837"/>
+            <a:ext cx="5396524" cy="4769424"/>
+          </a:xfrm>
+          <a:prstGeom prst="rect">
+            <a:avLst/>
+          </a:prstGeom>
+          <a:noFill/>
+          <a:ln>
+            <a:noFill/>
+          </a:ln>
+        </p:spPr>
+      </p:pic>
     </p:spTree>
   </p:cSld>
   <p:clrMapOvr>

</xml_diff>